<commit_message>
Added final draft of poster, results for IR_image_test
</commit_message>
<xml_diff>
--- a/doc/poster/poster.pptx
+++ b/doc/poster/poster.pptx
@@ -272,7 +272,7 @@
           <a:p>
             <a:fld id="{985D6BDF-9D0E-4E2B-85B8-D8F4790360C9}" type="datetimeFigureOut">
               <a:rPr lang="en-US" smtClean="0"/>
-              <a:t>4/12/2018</a:t>
+              <a:t>4/13/2018</a:t>
             </a:fld>
             <a:endParaRPr lang="en-US" dirty="0"/>
           </a:p>
@@ -472,7 +472,7 @@
           <a:p>
             <a:fld id="{985D6BDF-9D0E-4E2B-85B8-D8F4790360C9}" type="datetimeFigureOut">
               <a:rPr lang="en-US" smtClean="0"/>
-              <a:t>4/12/2018</a:t>
+              <a:t>4/13/2018</a:t>
             </a:fld>
             <a:endParaRPr lang="en-US" dirty="0"/>
           </a:p>
@@ -682,7 +682,7 @@
           <a:p>
             <a:fld id="{985D6BDF-9D0E-4E2B-85B8-D8F4790360C9}" type="datetimeFigureOut">
               <a:rPr lang="en-US" smtClean="0"/>
-              <a:t>4/12/2018</a:t>
+              <a:t>4/13/2018</a:t>
             </a:fld>
             <a:endParaRPr lang="en-US" dirty="0"/>
           </a:p>
@@ -2446,7 +2446,7 @@
           <a:p>
             <a:fld id="{985D6BDF-9D0E-4E2B-85B8-D8F4790360C9}" type="datetimeFigureOut">
               <a:rPr lang="en-US" smtClean="0"/>
-              <a:t>4/12/2018</a:t>
+              <a:t>4/13/2018</a:t>
             </a:fld>
             <a:endParaRPr lang="en-US" dirty="0"/>
           </a:p>
@@ -2722,7 +2722,7 @@
           <a:p>
             <a:fld id="{985D6BDF-9D0E-4E2B-85B8-D8F4790360C9}" type="datetimeFigureOut">
               <a:rPr lang="en-US" smtClean="0"/>
-              <a:t>4/12/2018</a:t>
+              <a:t>4/13/2018</a:t>
             </a:fld>
             <a:endParaRPr lang="en-US" dirty="0"/>
           </a:p>
@@ -2990,7 +2990,7 @@
           <a:p>
             <a:fld id="{985D6BDF-9D0E-4E2B-85B8-D8F4790360C9}" type="datetimeFigureOut">
               <a:rPr lang="en-US" smtClean="0"/>
-              <a:t>4/12/2018</a:t>
+              <a:t>4/13/2018</a:t>
             </a:fld>
             <a:endParaRPr lang="en-US" dirty="0"/>
           </a:p>
@@ -3405,7 +3405,7 @@
           <a:p>
             <a:fld id="{985D6BDF-9D0E-4E2B-85B8-D8F4790360C9}" type="datetimeFigureOut">
               <a:rPr lang="en-US" smtClean="0"/>
-              <a:t>4/12/2018</a:t>
+              <a:t>4/13/2018</a:t>
             </a:fld>
             <a:endParaRPr lang="en-US" dirty="0"/>
           </a:p>
@@ -3547,7 +3547,7 @@
           <a:p>
             <a:fld id="{985D6BDF-9D0E-4E2B-85B8-D8F4790360C9}" type="datetimeFigureOut">
               <a:rPr lang="en-US" smtClean="0"/>
-              <a:t>4/12/2018</a:t>
+              <a:t>4/13/2018</a:t>
             </a:fld>
             <a:endParaRPr lang="en-US" dirty="0"/>
           </a:p>
@@ -3660,7 +3660,7 @@
           <a:p>
             <a:fld id="{985D6BDF-9D0E-4E2B-85B8-D8F4790360C9}" type="datetimeFigureOut">
               <a:rPr lang="en-US" smtClean="0"/>
-              <a:t>4/12/2018</a:t>
+              <a:t>4/13/2018</a:t>
             </a:fld>
             <a:endParaRPr lang="en-US" dirty="0"/>
           </a:p>
@@ -3973,7 +3973,7 @@
           <a:p>
             <a:fld id="{985D6BDF-9D0E-4E2B-85B8-D8F4790360C9}" type="datetimeFigureOut">
               <a:rPr lang="en-US" smtClean="0"/>
-              <a:t>4/12/2018</a:t>
+              <a:t>4/13/2018</a:t>
             </a:fld>
             <a:endParaRPr lang="en-US" dirty="0"/>
           </a:p>
@@ -4266,7 +4266,7 @@
           <a:p>
             <a:fld id="{985D6BDF-9D0E-4E2B-85B8-D8F4790360C9}" type="datetimeFigureOut">
               <a:rPr lang="en-US" smtClean="0"/>
-              <a:t>4/12/2018</a:t>
+              <a:t>4/13/2018</a:t>
             </a:fld>
             <a:endParaRPr lang="en-US" dirty="0"/>
           </a:p>
@@ -4508,7 +4508,7 @@
           <a:p>
             <a:fld id="{985D6BDF-9D0E-4E2B-85B8-D8F4790360C9}" type="datetimeFigureOut">
               <a:rPr lang="en-US" smtClean="0"/>
-              <a:t>4/12/2018</a:t>
+              <a:t>4/13/2018</a:t>
             </a:fld>
             <a:endParaRPr lang="en-US" dirty="0"/>
           </a:p>
@@ -5132,31 +5132,7 @@
                 <a:ea typeface="Verdana" panose="020B0604030504040204" pitchFamily="34" charset="0"/>
                 <a:cs typeface="Verdana" panose="020B0604030504040204" pitchFamily="34" charset="0"/>
               </a:rPr>
-              <a:t>Social Media Intelligence (SOCMINT) is a relatively unexplored source </a:t>
-            </a:r>
-            <a:r>
-              <a:rPr lang="en-US" sz="2800" dirty="0" smtClean="0">
-                <a:latin typeface="Verdana" panose="020B0604030504040204" pitchFamily="34" charset="0"/>
-                <a:ea typeface="Verdana" panose="020B0604030504040204" pitchFamily="34" charset="0"/>
-                <a:cs typeface="Verdana" panose="020B0604030504040204" pitchFamily="34" charset="0"/>
-              </a:rPr>
-              <a:t>of </a:t>
-            </a:r>
-            <a:r>
-              <a:rPr lang="en-US" sz="2800" dirty="0" smtClean="0">
-                <a:latin typeface="Verdana" panose="020B0604030504040204" pitchFamily="34" charset="0"/>
-                <a:ea typeface="Verdana" panose="020B0604030504040204" pitchFamily="34" charset="0"/>
-                <a:cs typeface="Verdana" panose="020B0604030504040204" pitchFamily="34" charset="0"/>
-              </a:rPr>
-              <a:t>intelligence, examining data contained within social media profiles. It is a subset of Open Source Information, where </a:t>
-            </a:r>
-            <a:r>
-              <a:rPr lang="en-US" sz="2800" dirty="0" smtClean="0">
-                <a:latin typeface="Verdana" panose="020B0604030504040204" pitchFamily="34" charset="0"/>
-                <a:ea typeface="Verdana" panose="020B0604030504040204" pitchFamily="34" charset="0"/>
-                <a:cs typeface="Verdana" panose="020B0604030504040204" pitchFamily="34" charset="0"/>
-              </a:rPr>
-              <a:t>data on a subject is gathered using publicly available resources. Many see it as a vital aspect of modern information gathering – both the US FBI and the UK MOD have invested heavily in tools to utilize SOCMINT (Antonius and Rich, 2013)</a:t>
+              <a:t>Social Media Intelligence (SOCMINT) is a relatively unexplored source of intelligence, examining data contained within social media profiles. It is a subset of Open Source Information, where data on a subject is gathered using publicly available resources. Many see it as a vital aspect of modern information gathering – both the US FBI and the UK MOD have invested heavily in tools to utilize SOCMINT (Antonius and Rich, 2013)</a:t>
             </a:r>
           </a:p>
           <a:p>
@@ -5175,15 +5151,7 @@
                 <a:ea typeface="Verdana" panose="020B0604030504040204" pitchFamily="34" charset="0"/>
                 <a:cs typeface="Verdana" panose="020B0604030504040204" pitchFamily="34" charset="0"/>
               </a:rPr>
-              <a:t>There are very few examples of facial recognition being applied to SOCMINT to assist in gathering or analysis. </a:t>
-            </a:r>
-            <a:r>
-              <a:rPr lang="en-US" sz="2800" dirty="0" smtClean="0">
-                <a:latin typeface="Verdana" panose="020B0604030504040204" pitchFamily="34" charset="0"/>
-                <a:ea typeface="Verdana" panose="020B0604030504040204" pitchFamily="34" charset="0"/>
-                <a:cs typeface="Verdana" panose="020B0604030504040204" pitchFamily="34" charset="0"/>
-              </a:rPr>
-              <a:t>It is therefore my aim to develop a tool will assist human operators in gathering social media intelligence by searching a database of faces to find potential matches to a face in a test image.</a:t>
+              <a:t>There are very few examples of facial recognition being applied to SOCMINT to assist in gathering or analysis. It is therefore my aim to develop a tool will assist human operators in gathering social media intelligence by searching a database of faces to find potential matches to a face in a test image.</a:t>
             </a:r>
             <a:endParaRPr lang="en-US" sz="2800" dirty="0">
               <a:latin typeface="Verdana" panose="020B0604030504040204" pitchFamily="34" charset="0"/>
@@ -5263,8 +5231,8 @@
         </p:nvSpPr>
         <p:spPr bwMode="auto">
           <a:xfrm>
-            <a:off x="10929850" y="25309404"/>
-            <a:ext cx="8407576" cy="8107247"/>
+            <a:off x="10929850" y="25309403"/>
+            <a:ext cx="8407576" cy="11618029"/>
           </a:xfrm>
           <a:prstGeom prst="rect">
             <a:avLst/>
@@ -5289,7 +5257,7 @@
         </p:spPr>
         <p:txBody>
           <a:bodyPr lIns="173940" tIns="173940" rIns="173940" bIns="173940">
-            <a:spAutoFit/>
+            <a:noAutofit/>
           </a:bodyPr>
           <a:lstStyle>
             <a:lvl1pPr eaLnBrk="0" hangingPunct="0">
@@ -5416,15 +5384,7 @@
                 <a:ea typeface="Verdana" panose="020B0604030504040204" pitchFamily="34" charset="0"/>
                 <a:cs typeface="Verdana" panose="020B0604030504040204" pitchFamily="34" charset="0"/>
               </a:rPr>
-              <a:t>When searching across a data set with a different compression algorithm, the same results were noted. However, the distance between two </a:t>
-            </a:r>
-            <a:r>
-              <a:rPr lang="en-US" sz="2800" dirty="0" smtClean="0">
-                <a:latin typeface="Verdana" panose="020B0604030504040204" pitchFamily="34" charset="0"/>
-                <a:ea typeface="Verdana" panose="020B0604030504040204" pitchFamily="34" charset="0"/>
-                <a:cs typeface="Verdana" panose="020B0604030504040204" pitchFamily="34" charset="0"/>
-              </a:rPr>
-              <a:t>otherwise identical images was non-0, suggesting that the compression algorithm may produce some baseline error in comparison.</a:t>
+              <a:t>When searching across a data set with a different compression algorithm, the same results were noted. However, the distance between two otherwise identical images was non-0 suggesting that the compression algorithm may produce some baseline error during comparison.</a:t>
             </a:r>
           </a:p>
           <a:p>
@@ -5437,6 +5397,86 @@
           </a:p>
           <a:p>
             <a:pPr eaLnBrk="1" hangingPunct="1"/>
+            <a:r>
+              <a:rPr lang="en-US" sz="2800" dirty="0" smtClean="0">
+                <a:latin typeface="Verdana" panose="020B0604030504040204" pitchFamily="34" charset="0"/>
+                <a:ea typeface="Verdana" panose="020B0604030504040204" pitchFamily="34" charset="0"/>
+                <a:cs typeface="Verdana" panose="020B0604030504040204" pitchFamily="34" charset="0"/>
+              </a:rPr>
+              <a:t>Searching across the </a:t>
+            </a:r>
+            <a:r>
+              <a:rPr lang="en-US" sz="2800" dirty="0" err="1" smtClean="0">
+                <a:latin typeface="Verdana" panose="020B0604030504040204" pitchFamily="34" charset="0"/>
+                <a:ea typeface="Verdana" panose="020B0604030504040204" pitchFamily="34" charset="0"/>
+                <a:cs typeface="Verdana" panose="020B0604030504040204" pitchFamily="34" charset="0"/>
+              </a:rPr>
+              <a:t>SCFace</a:t>
+            </a:r>
+            <a:r>
+              <a:rPr lang="en-US" sz="2800" dirty="0" smtClean="0">
+                <a:latin typeface="Verdana" panose="020B0604030504040204" pitchFamily="34" charset="0"/>
+                <a:ea typeface="Verdana" panose="020B0604030504040204" pitchFamily="34" charset="0"/>
+                <a:cs typeface="Verdana" panose="020B0604030504040204" pitchFamily="34" charset="0"/>
+              </a:rPr>
+              <a:t> data set with the infra-red images produced </a:t>
+            </a:r>
+            <a:r>
+              <a:rPr lang="en-US" sz="2800" dirty="0" smtClean="0">
+                <a:latin typeface="Verdana" panose="020B0604030504040204" pitchFamily="34" charset="0"/>
+                <a:ea typeface="Verdana" panose="020B0604030504040204" pitchFamily="34" charset="0"/>
+                <a:cs typeface="Verdana" panose="020B0604030504040204" pitchFamily="34" charset="0"/>
+              </a:rPr>
+              <a:t>much worse results.</a:t>
+            </a:r>
+            <a:r>
+              <a:rPr lang="en-US" sz="2800" dirty="0" smtClean="0">
+                <a:latin typeface="Verdana" panose="020B0604030504040204" pitchFamily="34" charset="0"/>
+                <a:ea typeface="Verdana" panose="020B0604030504040204" pitchFamily="34" charset="0"/>
+                <a:cs typeface="Verdana" panose="020B0604030504040204" pitchFamily="34" charset="0"/>
+              </a:rPr>
+              <a:t> While the original image was always compared with a distance of 0, </a:t>
+            </a:r>
+            <a:r>
+              <a:rPr lang="en-US" sz="2800" dirty="0" smtClean="0">
+                <a:latin typeface="Verdana" panose="020B0604030504040204" pitchFamily="34" charset="0"/>
+                <a:ea typeface="Verdana" panose="020B0604030504040204" pitchFamily="34" charset="0"/>
+                <a:cs typeface="Verdana" panose="020B0604030504040204" pitchFamily="34" charset="0"/>
+              </a:rPr>
+              <a:t>the accuracy was negatively impacted by the presence of several false positives. It is </a:t>
+            </a:r>
+            <a:r>
+              <a:rPr lang="en-US" sz="2800" dirty="0" err="1" smtClean="0">
+                <a:latin typeface="Verdana" panose="020B0604030504040204" pitchFamily="34" charset="0"/>
+                <a:ea typeface="Verdana" panose="020B0604030504040204" pitchFamily="34" charset="0"/>
+                <a:cs typeface="Verdana" panose="020B0604030504040204" pitchFamily="34" charset="0"/>
+              </a:rPr>
+              <a:t>theorised</a:t>
+            </a:r>
+            <a:r>
+              <a:rPr lang="en-US" sz="2800" dirty="0" smtClean="0">
+                <a:latin typeface="Verdana" panose="020B0604030504040204" pitchFamily="34" charset="0"/>
+                <a:ea typeface="Verdana" panose="020B0604030504040204" pitchFamily="34" charset="0"/>
+                <a:cs typeface="Verdana" panose="020B0604030504040204" pitchFamily="34" charset="0"/>
+              </a:rPr>
+              <a:t> that the IR images lack facial detail, and are difficult to place descriptors on due to the lack of </a:t>
+            </a:r>
+            <a:r>
+              <a:rPr lang="en-US" sz="2800" dirty="0" err="1" smtClean="0">
+                <a:latin typeface="Verdana" panose="020B0604030504040204" pitchFamily="34" charset="0"/>
+                <a:ea typeface="Verdana" panose="020B0604030504040204" pitchFamily="34" charset="0"/>
+                <a:cs typeface="Verdana" panose="020B0604030504040204" pitchFamily="34" charset="0"/>
+              </a:rPr>
+              <a:t>colour</a:t>
+            </a:r>
+            <a:r>
+              <a:rPr lang="en-US" sz="2800" dirty="0" smtClean="0">
+                <a:latin typeface="Verdana" panose="020B0604030504040204" pitchFamily="34" charset="0"/>
+                <a:ea typeface="Verdana" panose="020B0604030504040204" pitchFamily="34" charset="0"/>
+                <a:cs typeface="Verdana" panose="020B0604030504040204" pitchFamily="34" charset="0"/>
+              </a:rPr>
+              <a:t>.</a:t>
+            </a:r>
             <a:endParaRPr lang="en-US" sz="2800" dirty="0">
               <a:latin typeface="Verdana" panose="020B0604030504040204" pitchFamily="34" charset="0"/>
               <a:ea typeface="Verdana" panose="020B0604030504040204" pitchFamily="34" charset="0"/>
@@ -5788,11 +5828,6 @@
               </a:rPr>
               <a:t>The software was tested using data sets with different compression algorithms (JPG vs PNG), untrained data sets, data sets containing infra-red images, and data sets that were restricting by a piece of personally identifying information.</a:t>
             </a:r>
-            <a:endParaRPr lang="en-US" sz="2800" dirty="0">
-              <a:latin typeface="Verdana" panose="020B0604030504040204" pitchFamily="34" charset="0"/>
-              <a:ea typeface="Verdana" panose="020B0604030504040204" pitchFamily="34" charset="0"/>
-              <a:cs typeface="Verdana" panose="020B0604030504040204" pitchFamily="34" charset="0"/>
-            </a:endParaRPr>
           </a:p>
         </p:txBody>
       </p:sp>
@@ -5851,7 +5886,7 @@
       </p:sp>
       <p:sp>
         <p:nvSpPr>
-          <p:cNvPr id="12" name="Text Box 191"/>
+          <p:cNvPr id="14" name="Text Box 193"/>
           <p:cNvSpPr txBox="1">
             <a:spLocks noChangeArrowheads="1"/>
           </p:cNvSpPr>
@@ -5859,8 +5894,8 @@
         </p:nvSpPr>
         <p:spPr bwMode="auto">
           <a:xfrm>
-            <a:off x="20178184" y="17385160"/>
-            <a:ext cx="8407576" cy="8538134"/>
+            <a:off x="20178184" y="13988584"/>
+            <a:ext cx="8407576" cy="16509547"/>
           </a:xfrm>
           <a:prstGeom prst="rect">
             <a:avLst/>
@@ -5986,327 +6021,10 @@
           <a:p>
             <a:pPr eaLnBrk="1" hangingPunct="1"/>
             <a:r>
-              <a:rPr lang="en-US" sz="2800" dirty="0">
-                <a:latin typeface="Verdana" panose="020B0604030504040204" pitchFamily="34" charset="0"/>
-                <a:ea typeface="Verdana" panose="020B0604030504040204" pitchFamily="34" charset="0"/>
-                <a:cs typeface="Verdana" panose="020B0604030504040204" pitchFamily="34" charset="0"/>
-              </a:rPr>
-              <a:t>Click here to insert your Discussion text. Type it in or copy and paste from your Word document or other source.</a:t>
-            </a:r>
-          </a:p>
-          <a:p>
-            <a:pPr eaLnBrk="1" hangingPunct="1"/>
-            <a:endParaRPr lang="en-US" sz="2800" dirty="0">
-              <a:latin typeface="Verdana" panose="020B0604030504040204" pitchFamily="34" charset="0"/>
-              <a:ea typeface="Verdana" panose="020B0604030504040204" pitchFamily="34" charset="0"/>
-              <a:cs typeface="Verdana" panose="020B0604030504040204" pitchFamily="34" charset="0"/>
-            </a:endParaRPr>
-          </a:p>
-          <a:p>
-            <a:pPr eaLnBrk="1" hangingPunct="1"/>
-            <a:r>
-              <a:rPr lang="en-US" sz="2800" dirty="0">
-                <a:latin typeface="Verdana" panose="020B0604030504040204" pitchFamily="34" charset="0"/>
-                <a:ea typeface="Verdana" panose="020B0604030504040204" pitchFamily="34" charset="0"/>
-                <a:cs typeface="Verdana" panose="020B0604030504040204" pitchFamily="34" charset="0"/>
-              </a:rPr>
-              <a:t>This text box will automatically re-size to your text. To turn off that feature, right click inside this box and go to </a:t>
-            </a:r>
-            <a:r>
-              <a:rPr lang="en-US" sz="2800" b="1" dirty="0">
-                <a:latin typeface="Verdana" panose="020B0604030504040204" pitchFamily="34" charset="0"/>
-                <a:ea typeface="Verdana" panose="020B0604030504040204" pitchFamily="34" charset="0"/>
-                <a:cs typeface="Verdana" panose="020B0604030504040204" pitchFamily="34" charset="0"/>
-              </a:rPr>
-              <a:t>Format Shape, Text Box, Autofit</a:t>
-            </a:r>
-            <a:r>
-              <a:rPr lang="en-US" sz="2800" dirty="0">
-                <a:latin typeface="Verdana" panose="020B0604030504040204" pitchFamily="34" charset="0"/>
-                <a:ea typeface="Verdana" panose="020B0604030504040204" pitchFamily="34" charset="0"/>
-                <a:cs typeface="Verdana" panose="020B0604030504040204" pitchFamily="34" charset="0"/>
-              </a:rPr>
-              <a:t>, and select the “Do Not Autofit” radio button.</a:t>
-            </a:r>
-          </a:p>
-          <a:p>
-            <a:pPr eaLnBrk="1" hangingPunct="1"/>
-            <a:endParaRPr lang="en-US" sz="2800" dirty="0">
-              <a:latin typeface="Verdana" panose="020B0604030504040204" pitchFamily="34" charset="0"/>
-              <a:ea typeface="Verdana" panose="020B0604030504040204" pitchFamily="34" charset="0"/>
-              <a:cs typeface="Verdana" panose="020B0604030504040204" pitchFamily="34" charset="0"/>
-            </a:endParaRPr>
-          </a:p>
-          <a:p>
-            <a:pPr eaLnBrk="1" hangingPunct="1"/>
-            <a:r>
-              <a:rPr lang="en-US" sz="2800" dirty="0">
-                <a:latin typeface="Verdana" panose="020B0604030504040204" pitchFamily="34" charset="0"/>
-                <a:ea typeface="Verdana" panose="020B0604030504040204" pitchFamily="34" charset="0"/>
-                <a:cs typeface="Verdana" panose="020B0604030504040204" pitchFamily="34" charset="0"/>
-              </a:rPr>
-              <a:t>To change the font style of this text box: Click on the border once to highlight the entire text box, then select a different font or font size that suits you. This text is Calibri 30pt and is easily read up to 4 feet away on an A0 poster.</a:t>
-            </a:r>
-          </a:p>
-          <a:p>
-            <a:pPr eaLnBrk="1" hangingPunct="1"/>
-            <a:endParaRPr lang="en-US" sz="2800" dirty="0">
-              <a:latin typeface="Verdana" panose="020B0604030504040204" pitchFamily="34" charset="0"/>
-              <a:ea typeface="Verdana" panose="020B0604030504040204" pitchFamily="34" charset="0"/>
-              <a:cs typeface="Verdana" panose="020B0604030504040204" pitchFamily="34" charset="0"/>
-            </a:endParaRPr>
-          </a:p>
-          <a:p>
-            <a:pPr eaLnBrk="1" hangingPunct="1"/>
-            <a:r>
-              <a:rPr lang="en-US" sz="2800" dirty="0">
-                <a:latin typeface="Verdana" panose="020B0604030504040204" pitchFamily="34" charset="0"/>
-                <a:ea typeface="Verdana" panose="020B0604030504040204" pitchFamily="34" charset="0"/>
-                <a:cs typeface="Verdana" panose="020B0604030504040204" pitchFamily="34" charset="0"/>
-              </a:rPr>
-              <a:t>Zoom out to 100% to preview what this will look like on your printed poster.</a:t>
-            </a:r>
-          </a:p>
-        </p:txBody>
-      </p:sp>
-      <p:sp>
-        <p:nvSpPr>
-          <p:cNvPr id="35" name="Rectangle 34"/>
-          <p:cNvSpPr/>
-          <p:nvPr/>
-        </p:nvSpPr>
-        <p:spPr>
-          <a:xfrm>
-            <a:off x="20178184" y="16493613"/>
-            <a:ext cx="8407576" cy="891547"/>
-          </a:xfrm>
-          <a:prstGeom prst="rect">
-            <a:avLst/>
-          </a:prstGeom>
-          <a:solidFill>
-            <a:srgbClr val="660066"/>
-          </a:solidFill>
-          <a:effectLst>
-            <a:outerShdw blurRad="50800" dist="38100" dir="2700000" algn="tl" rotWithShape="0">
-              <a:prstClr val="black">
-                <a:alpha val="40000"/>
-              </a:prstClr>
-            </a:outerShdw>
-          </a:effectLst>
-        </p:spPr>
-        <p:style>
-          <a:lnRef idx="2">
-            <a:schemeClr val="accent1">
-              <a:shade val="50000"/>
-            </a:schemeClr>
-          </a:lnRef>
-          <a:fillRef idx="1">
-            <a:schemeClr val="accent1"/>
-          </a:fillRef>
-          <a:effectRef idx="0">
-            <a:schemeClr val="accent1"/>
-          </a:effectRef>
-          <a:fontRef idx="minor">
-            <a:schemeClr val="lt1"/>
-          </a:fontRef>
-        </p:style>
-        <p:txBody>
-          <a:bodyPr lIns="86970" tIns="43485" rIns="86970" bIns="43485" rtlCol="0" anchor="ctr"/>
-          <a:lstStyle/>
-          <a:p>
-            <a:pPr algn="ctr"/>
-            <a:r>
-              <a:rPr lang="en-US" sz="5400" b="1" dirty="0">
-                <a:solidFill>
-                  <a:schemeClr val="accent3">
-                    <a:lumMod val="20000"/>
-                    <a:lumOff val="80000"/>
-                  </a:schemeClr>
-                </a:solidFill>
-              </a:rPr>
-              <a:t>Discussion</a:t>
-            </a:r>
-          </a:p>
-        </p:txBody>
-      </p:sp>
-      <p:sp>
-        <p:nvSpPr>
-          <p:cNvPr id="14" name="Text Box 193"/>
-          <p:cNvSpPr txBox="1">
-            <a:spLocks noChangeArrowheads="1"/>
-          </p:cNvSpPr>
-          <p:nvPr/>
-        </p:nvSpPr>
-        <p:spPr bwMode="auto">
-          <a:xfrm>
-            <a:off x="20178184" y="27637946"/>
-            <a:ext cx="8407576" cy="4690927"/>
-          </a:xfrm>
-          <a:prstGeom prst="rect">
-            <a:avLst/>
-          </a:prstGeom>
-          <a:solidFill>
-            <a:schemeClr val="bg1"/>
-          </a:solidFill>
-          <a:ln w="12700">
-            <a:solidFill>
-              <a:srgbClr val="660066"/>
-            </a:solidFill>
-          </a:ln>
-          <a:effectLst>
-            <a:outerShdw blurRad="50800" dist="38100" dir="2700000" algn="tl" rotWithShape="0">
-              <a:prstClr val="black">
-                <a:alpha val="40000"/>
-              </a:prstClr>
-            </a:outerShdw>
-          </a:effectLst>
-        </p:spPr>
-        <p:txBody>
-          <a:bodyPr lIns="173940" tIns="173940" rIns="173940" bIns="173940">
-            <a:spAutoFit/>
-          </a:bodyPr>
-          <a:lstStyle>
-            <a:lvl1pPr eaLnBrk="0" hangingPunct="0">
-              <a:defRPr sz="2200">
-                <a:solidFill>
-                  <a:schemeClr val="tx1"/>
-                </a:solidFill>
-                <a:latin typeface="Arial" charset="0"/>
-              </a:defRPr>
-            </a:lvl1pPr>
-            <a:lvl2pPr marL="742950" indent="-285750" eaLnBrk="0" hangingPunct="0">
-              <a:defRPr sz="2200">
-                <a:solidFill>
-                  <a:schemeClr val="tx1"/>
-                </a:solidFill>
-                <a:latin typeface="Arial" charset="0"/>
-              </a:defRPr>
-            </a:lvl2pPr>
-            <a:lvl3pPr marL="1143000" indent="-228600" eaLnBrk="0" hangingPunct="0">
-              <a:defRPr sz="2200">
-                <a:solidFill>
-                  <a:schemeClr val="tx1"/>
-                </a:solidFill>
-                <a:latin typeface="Arial" charset="0"/>
-              </a:defRPr>
-            </a:lvl3pPr>
-            <a:lvl4pPr marL="1600200" indent="-228600" eaLnBrk="0" hangingPunct="0">
-              <a:defRPr sz="2200">
-                <a:solidFill>
-                  <a:schemeClr val="tx1"/>
-                </a:solidFill>
-                <a:latin typeface="Arial" charset="0"/>
-              </a:defRPr>
-            </a:lvl4pPr>
-            <a:lvl5pPr marL="2057400" indent="-228600" eaLnBrk="0" hangingPunct="0">
-              <a:defRPr sz="2200">
-                <a:solidFill>
-                  <a:schemeClr val="tx1"/>
-                </a:solidFill>
-                <a:latin typeface="Arial" charset="0"/>
-              </a:defRPr>
-            </a:lvl5pPr>
-            <a:lvl6pPr marL="2514600" indent="-228600" eaLnBrk="0" fontAlgn="base" hangingPunct="0">
-              <a:spcBef>
-                <a:spcPct val="0"/>
-              </a:spcBef>
-              <a:spcAft>
-                <a:spcPct val="0"/>
-              </a:spcAft>
-              <a:defRPr sz="2200">
-                <a:solidFill>
-                  <a:schemeClr val="tx1"/>
-                </a:solidFill>
-                <a:latin typeface="Arial" charset="0"/>
-              </a:defRPr>
-            </a:lvl6pPr>
-            <a:lvl7pPr marL="2971800" indent="-228600" eaLnBrk="0" fontAlgn="base" hangingPunct="0">
-              <a:spcBef>
-                <a:spcPct val="0"/>
-              </a:spcBef>
-              <a:spcAft>
-                <a:spcPct val="0"/>
-              </a:spcAft>
-              <a:defRPr sz="2200">
-                <a:solidFill>
-                  <a:schemeClr val="tx1"/>
-                </a:solidFill>
-                <a:latin typeface="Arial" charset="0"/>
-              </a:defRPr>
-            </a:lvl7pPr>
-            <a:lvl8pPr marL="3429000" indent="-228600" eaLnBrk="0" fontAlgn="base" hangingPunct="0">
-              <a:spcBef>
-                <a:spcPct val="0"/>
-              </a:spcBef>
-              <a:spcAft>
-                <a:spcPct val="0"/>
-              </a:spcAft>
-              <a:defRPr sz="2200">
-                <a:solidFill>
-                  <a:schemeClr val="tx1"/>
-                </a:solidFill>
-                <a:latin typeface="Arial" charset="0"/>
-              </a:defRPr>
-            </a:lvl8pPr>
-            <a:lvl9pPr marL="3886200" indent="-228600" eaLnBrk="0" fontAlgn="base" hangingPunct="0">
-              <a:spcBef>
-                <a:spcPct val="0"/>
-              </a:spcBef>
-              <a:spcAft>
-                <a:spcPct val="0"/>
-              </a:spcAft>
-              <a:defRPr sz="2200">
-                <a:solidFill>
-                  <a:schemeClr val="tx1"/>
-                </a:solidFill>
-                <a:latin typeface="Arial" charset="0"/>
-              </a:defRPr>
-            </a:lvl9pPr>
-          </a:lstStyle>
-          <a:p>
-            <a:pPr eaLnBrk="1" hangingPunct="1"/>
-            <a:r>
-              <a:rPr lang="en-US" sz="2800" dirty="0">
-                <a:latin typeface="Verdana" panose="020B0604030504040204" pitchFamily="34" charset="0"/>
-                <a:ea typeface="Verdana" panose="020B0604030504040204" pitchFamily="34" charset="0"/>
-                <a:cs typeface="Verdana" panose="020B0604030504040204" pitchFamily="34" charset="0"/>
-              </a:rPr>
-              <a:t>Click here to insert your Conclusions text. Type it in or copy and paste from your Word document or other source.</a:t>
-            </a:r>
-          </a:p>
-          <a:p>
-            <a:pPr eaLnBrk="1" hangingPunct="1"/>
-            <a:endParaRPr lang="en-US" sz="2800" dirty="0">
-              <a:latin typeface="Verdana" panose="020B0604030504040204" pitchFamily="34" charset="0"/>
-              <a:ea typeface="Verdana" panose="020B0604030504040204" pitchFamily="34" charset="0"/>
-              <a:cs typeface="Verdana" panose="020B0604030504040204" pitchFamily="34" charset="0"/>
-            </a:endParaRPr>
-          </a:p>
-          <a:p>
-            <a:pPr eaLnBrk="1" hangingPunct="1"/>
-            <a:r>
-              <a:rPr lang="en-US" sz="2800" dirty="0">
-                <a:latin typeface="Verdana" panose="020B0604030504040204" pitchFamily="34" charset="0"/>
-                <a:ea typeface="Verdana" panose="020B0604030504040204" pitchFamily="34" charset="0"/>
-                <a:cs typeface="Verdana" panose="020B0604030504040204" pitchFamily="34" charset="0"/>
-              </a:rPr>
-              <a:t>This text box will automatically re-size to your text. To turn off that feature, right click inside this box and go to </a:t>
-            </a:r>
-            <a:r>
-              <a:rPr lang="en-US" sz="2800" b="1" dirty="0">
-                <a:latin typeface="Verdana" panose="020B0604030504040204" pitchFamily="34" charset="0"/>
-                <a:ea typeface="Verdana" panose="020B0604030504040204" pitchFamily="34" charset="0"/>
-                <a:cs typeface="Verdana" panose="020B0604030504040204" pitchFamily="34" charset="0"/>
-              </a:rPr>
-              <a:t>Format Shape, Text Box, Autofit</a:t>
-            </a:r>
-            <a:r>
-              <a:rPr lang="en-US" sz="2800" dirty="0">
-                <a:latin typeface="Verdana" panose="020B0604030504040204" pitchFamily="34" charset="0"/>
-                <a:ea typeface="Verdana" panose="020B0604030504040204" pitchFamily="34" charset="0"/>
-                <a:cs typeface="Verdana" panose="020B0604030504040204" pitchFamily="34" charset="0"/>
-              </a:rPr>
-              <a:t>, and select the “Do Not Autofit” radio button.</a:t>
+              <a:rPr lang="en-US" sz="3000" dirty="0" smtClean="0">
+                <a:latin typeface="Calibri" pitchFamily="34" charset="0"/>
+              </a:rPr>
+              <a:t>The program implemented shows that, yes, it is possible to use facial recognition to assist in the gathering and analysis of social media intelligence. The automation of this task could be greatly beneficial to intelligence services, private firms wishing to gather intelligence, or private citizens wishing to see their SOCMINT footprint. There are however several caveats:</a:t>
             </a:r>
           </a:p>
           <a:p>
@@ -6315,6 +6033,48 @@
               <a:latin typeface="Calibri" pitchFamily="34" charset="0"/>
             </a:endParaRPr>
           </a:p>
+          <a:p>
+            <a:pPr eaLnBrk="1" hangingPunct="1"/>
+            <a:r>
+              <a:rPr lang="en-US" sz="3000" dirty="0" smtClean="0">
+                <a:latin typeface="Calibri" pitchFamily="34" charset="0"/>
+              </a:rPr>
+              <a:t>While testing showed promising results in terms of accuracy, the time taken for each search is excessive. The program can undoubtedly search large data sets faster than a human could, but having searches last over an hour over a small data set (in comparison to all profile photos on a social networking service) means that it is unlikely to be able to scale well.</a:t>
+            </a:r>
+          </a:p>
+          <a:p>
+            <a:pPr eaLnBrk="1" hangingPunct="1"/>
+            <a:endParaRPr lang="en-US" sz="3000" dirty="0">
+              <a:latin typeface="Calibri" pitchFamily="34" charset="0"/>
+            </a:endParaRPr>
+          </a:p>
+          <a:p>
+            <a:pPr eaLnBrk="1" hangingPunct="1"/>
+            <a:r>
+              <a:rPr lang="en-US" sz="3000" dirty="0" smtClean="0">
+                <a:latin typeface="Calibri" pitchFamily="34" charset="0"/>
+              </a:rPr>
+              <a:t>As a corollary, since the time taken for each search is so long only limited testing could be performed. It is likely that the 100% accuracy rating achieved over the tests is close to the true accuracy that the program could achieve, the small sample size of tests makes it difficult to say this definitively.</a:t>
+            </a:r>
+          </a:p>
+          <a:p>
+            <a:pPr eaLnBrk="1" hangingPunct="1"/>
+            <a:endParaRPr lang="en-US" sz="3000" dirty="0">
+              <a:latin typeface="Calibri" pitchFamily="34" charset="0"/>
+            </a:endParaRPr>
+          </a:p>
+          <a:p>
+            <a:pPr eaLnBrk="1" hangingPunct="1"/>
+            <a:r>
+              <a:rPr lang="en-US" sz="3000" dirty="0" smtClean="0">
+                <a:latin typeface="Calibri" pitchFamily="34" charset="0"/>
+              </a:rPr>
+              <a:t>Finally, the service this program provides may not be accessible to all. Using it against a real social network rather than a test data set would require setting up a proxy server to present data in the expected manner, as well as having the service in question allow access to the full (or at least, a sizeable portion) collection of profile images. This is feasible for security services and large corporations but is likely outside the scope of what a single person could acquire.</a:t>
+            </a:r>
+            <a:endParaRPr lang="en-US" sz="3000" dirty="0">
+              <a:latin typeface="Calibri" pitchFamily="34" charset="0"/>
+            </a:endParaRPr>
+          </a:p>
         </p:txBody>
       </p:sp>
       <p:sp>
@@ -6325,7 +6085,7 @@
         </p:nvSpPr>
         <p:spPr>
           <a:xfrm>
-            <a:off x="20178184" y="26693553"/>
+            <a:off x="20178184" y="13044191"/>
             <a:ext cx="8407576" cy="891547"/>
           </a:xfrm>
           <a:prstGeom prst="rect">
@@ -6998,7 +6758,7 @@
         <p:spPr bwMode="auto">
           <a:xfrm>
             <a:off x="20207583" y="11304633"/>
-            <a:ext cx="8407578" cy="826483"/>
+            <a:ext cx="8407578" cy="1195815"/>
           </a:xfrm>
           <a:prstGeom prst="rect">
             <a:avLst/>
@@ -7157,7 +6917,7 @@
               <a:rPr lang="en-US" sz="2400" dirty="0" smtClean="0">
                 <a:latin typeface="Calibri" pitchFamily="34" charset="0"/>
               </a:rPr>
-              <a:t>Results when using searching with the test image Aaron_Peirsol_0001.jpg, restricted with the term “Aaron*”.</a:t>
+              <a:t>Results when using searching with the test image Aaron_Peirsol_0001.jpg, restricted with the term “Aaron*” (i.e. search for all people named “Aaron”).</a:t>
             </a:r>
             <a:endParaRPr lang="en-US" sz="2400" dirty="0">
               <a:latin typeface="Calibri" pitchFamily="34" charset="0"/>
@@ -7723,8 +7483,8 @@
         </p:nvSpPr>
         <p:spPr bwMode="auto">
           <a:xfrm>
-            <a:off x="20207583" y="33559020"/>
-            <a:ext cx="8407576" cy="3582931"/>
+            <a:off x="20207583" y="31786476"/>
+            <a:ext cx="8407576" cy="5140956"/>
           </a:xfrm>
           <a:prstGeom prst="rect">
             <a:avLst/>
@@ -7747,7 +7507,7 @@
         </p:spPr>
         <p:txBody>
           <a:bodyPr lIns="173940" tIns="173940" rIns="173940" bIns="173940">
-            <a:spAutoFit/>
+            <a:noAutofit/>
           </a:bodyPr>
           <a:lstStyle>
             <a:lvl1pPr eaLnBrk="0" hangingPunct="0">
@@ -7850,7 +7610,7 @@
           <a:p>
             <a:pPr eaLnBrk="1" hangingPunct="1"/>
             <a:r>
-              <a:rPr lang="en-US" sz="1400" dirty="0" smtClean="0">
+              <a:rPr lang="en-US" sz="1700" dirty="0" smtClean="0">
                 <a:latin typeface="Verdana" panose="020B0604030504040204" pitchFamily="34" charset="0"/>
                 <a:ea typeface="Verdana" panose="020B0604030504040204" pitchFamily="34" charset="0"/>
                 <a:cs typeface="Verdana" panose="020B0604030504040204" pitchFamily="34" charset="0"/>
@@ -7860,7 +7620,7 @@
           </a:p>
           <a:p>
             <a:pPr eaLnBrk="1" hangingPunct="1"/>
-            <a:endParaRPr lang="en-US" sz="1400" dirty="0">
+            <a:endParaRPr lang="en-US" sz="1700" dirty="0">
               <a:latin typeface="Verdana" panose="020B0604030504040204" pitchFamily="34" charset="0"/>
               <a:ea typeface="Verdana" panose="020B0604030504040204" pitchFamily="34" charset="0"/>
               <a:cs typeface="Verdana" panose="020B0604030504040204" pitchFamily="34" charset="0"/>
@@ -7869,7 +7629,7 @@
           <a:p>
             <a:pPr eaLnBrk="1" hangingPunct="1"/>
             <a:r>
-              <a:rPr lang="en-US" sz="1400" dirty="0" err="1" smtClean="0">
+              <a:rPr lang="en-US" sz="1700" dirty="0" err="1" smtClean="0">
                 <a:latin typeface="Verdana" panose="020B0604030504040204" pitchFamily="34" charset="0"/>
                 <a:ea typeface="Verdana" panose="020B0604030504040204" pitchFamily="34" charset="0"/>
                 <a:cs typeface="Verdana" panose="020B0604030504040204" pitchFamily="34" charset="0"/>
@@ -7877,7 +7637,7 @@
               <a:t>Kandias</a:t>
             </a:r>
             <a:r>
-              <a:rPr lang="en-US" sz="1400" dirty="0" smtClean="0">
+              <a:rPr lang="en-US" sz="1700" dirty="0" smtClean="0">
                 <a:latin typeface="Verdana" panose="020B0604030504040204" pitchFamily="34" charset="0"/>
                 <a:ea typeface="Verdana" panose="020B0604030504040204" pitchFamily="34" charset="0"/>
                 <a:cs typeface="Verdana" panose="020B0604030504040204" pitchFamily="34" charset="0"/>
@@ -7885,7 +7645,7 @@
               <a:t>, M. and </a:t>
             </a:r>
             <a:r>
-              <a:rPr lang="en-US" sz="1400" dirty="0" err="1" smtClean="0">
+              <a:rPr lang="en-US" sz="1700" dirty="0" err="1" smtClean="0">
                 <a:latin typeface="Verdana" panose="020B0604030504040204" pitchFamily="34" charset="0"/>
                 <a:ea typeface="Verdana" panose="020B0604030504040204" pitchFamily="34" charset="0"/>
                 <a:cs typeface="Verdana" panose="020B0604030504040204" pitchFamily="34" charset="0"/>
@@ -7893,7 +7653,7 @@
               <a:t>Stavrou</a:t>
             </a:r>
             <a:r>
-              <a:rPr lang="en-US" sz="1400" dirty="0" smtClean="0">
+              <a:rPr lang="en-US" sz="1700" dirty="0" smtClean="0">
                 <a:latin typeface="Verdana" panose="020B0604030504040204" pitchFamily="34" charset="0"/>
                 <a:ea typeface="Verdana" panose="020B0604030504040204" pitchFamily="34" charset="0"/>
                 <a:cs typeface="Verdana" panose="020B0604030504040204" pitchFamily="34" charset="0"/>
@@ -7903,7 +7663,7 @@
           </a:p>
           <a:p>
             <a:pPr eaLnBrk="1" hangingPunct="1"/>
-            <a:endParaRPr lang="en-US" sz="1400" dirty="0" smtClean="0">
+            <a:endParaRPr lang="en-US" sz="1700" dirty="0" smtClean="0">
               <a:latin typeface="Verdana" panose="020B0604030504040204" pitchFamily="34" charset="0"/>
               <a:ea typeface="Verdana" panose="020B0604030504040204" pitchFamily="34" charset="0"/>
               <a:cs typeface="Verdana" panose="020B0604030504040204" pitchFamily="34" charset="0"/>
@@ -7912,7 +7672,7 @@
           <a:p>
             <a:pPr eaLnBrk="1" hangingPunct="1"/>
             <a:r>
-              <a:rPr lang="en-US" sz="1400" dirty="0" err="1" smtClean="0">
+              <a:rPr lang="en-US" sz="1700" dirty="0" err="1" smtClean="0">
                 <a:latin typeface="Verdana" panose="020B0604030504040204" pitchFamily="34" charset="0"/>
                 <a:ea typeface="Verdana" panose="020B0604030504040204" pitchFamily="34" charset="0"/>
                 <a:cs typeface="Verdana" panose="020B0604030504040204" pitchFamily="34" charset="0"/>
@@ -7920,7 +7680,7 @@
               <a:t>Omand</a:t>
             </a:r>
             <a:r>
-              <a:rPr lang="en-US" sz="1400" dirty="0" smtClean="0">
+              <a:rPr lang="en-US" sz="1700" dirty="0" smtClean="0">
                 <a:latin typeface="Verdana" panose="020B0604030504040204" pitchFamily="34" charset="0"/>
                 <a:ea typeface="Verdana" panose="020B0604030504040204" pitchFamily="34" charset="0"/>
                 <a:cs typeface="Verdana" panose="020B0604030504040204" pitchFamily="34" charset="0"/>
@@ -7928,7 +7688,7 @@
               <a:t>, S. D., Bartlett, J. and Miller, C. (2012), ‘Introducing social media intelligence (</a:t>
             </a:r>
             <a:r>
-              <a:rPr lang="en-US" sz="1400" dirty="0" err="1" smtClean="0">
+              <a:rPr lang="en-US" sz="1700" dirty="0" err="1" smtClean="0">
                 <a:latin typeface="Verdana" panose="020B0604030504040204" pitchFamily="34" charset="0"/>
                 <a:ea typeface="Verdana" panose="020B0604030504040204" pitchFamily="34" charset="0"/>
                 <a:cs typeface="Verdana" panose="020B0604030504040204" pitchFamily="34" charset="0"/>
@@ -7936,7 +7696,7 @@
               <a:t>socmint</a:t>
             </a:r>
             <a:r>
-              <a:rPr lang="en-US" sz="1400" dirty="0" smtClean="0">
+              <a:rPr lang="en-US" sz="1700" dirty="0" smtClean="0">
                 <a:latin typeface="Verdana" panose="020B0604030504040204" pitchFamily="34" charset="0"/>
                 <a:ea typeface="Verdana" panose="020B0604030504040204" pitchFamily="34" charset="0"/>
                 <a:cs typeface="Verdana" panose="020B0604030504040204" pitchFamily="34" charset="0"/>
@@ -7944,33 +7704,25 @@
               <a:t>)’, </a:t>
             </a:r>
             <a:r>
-              <a:rPr lang="en-US" sz="1400" i="1" dirty="0" smtClean="0">
+              <a:rPr lang="en-US" sz="1700" i="1" dirty="0" smtClean="0">
                 <a:latin typeface="Verdana" panose="020B0604030504040204" pitchFamily="34" charset="0"/>
                 <a:ea typeface="Verdana" panose="020B0604030504040204" pitchFamily="34" charset="0"/>
                 <a:cs typeface="Verdana" panose="020B0604030504040204" pitchFamily="34" charset="0"/>
               </a:rPr>
-              <a:t>Intelligence and National Securit</a:t>
-            </a:r>
-            <a:r>
-              <a:rPr lang="en-US" sz="1400" i="1" dirty="0" smtClean="0">
+              <a:t>Intelligence and National Security </a:t>
+            </a:r>
+            <a:r>
+              <a:rPr lang="en-US" sz="1700" dirty="0" smtClean="0">
                 <a:latin typeface="Verdana" panose="020B0604030504040204" pitchFamily="34" charset="0"/>
                 <a:ea typeface="Verdana" panose="020B0604030504040204" pitchFamily="34" charset="0"/>
                 <a:cs typeface="Verdana" panose="020B0604030504040204" pitchFamily="34" charset="0"/>
               </a:rPr>
-              <a:t>y </a:t>
-            </a:r>
-            <a:r>
-              <a:rPr lang="en-US" sz="1400" dirty="0" smtClean="0">
-                <a:latin typeface="Verdana" panose="020B0604030504040204" pitchFamily="34" charset="0"/>
-                <a:ea typeface="Verdana" panose="020B0604030504040204" pitchFamily="34" charset="0"/>
-                <a:cs typeface="Verdana" panose="020B0604030504040204" pitchFamily="34" charset="0"/>
-              </a:rPr>
               <a:t>27(6), 801-823.</a:t>
             </a:r>
           </a:p>
           <a:p>
             <a:pPr eaLnBrk="1" hangingPunct="1"/>
-            <a:endParaRPr lang="en-US" sz="1400" dirty="0">
+            <a:endParaRPr lang="en-US" sz="1700" dirty="0">
               <a:latin typeface="Verdana" panose="020B0604030504040204" pitchFamily="34" charset="0"/>
               <a:ea typeface="Verdana" panose="020B0604030504040204" pitchFamily="34" charset="0"/>
               <a:cs typeface="Verdana" panose="020B0604030504040204" pitchFamily="34" charset="0"/>
@@ -7979,7 +7731,7 @@
           <a:p>
             <a:pPr eaLnBrk="1" hangingPunct="1"/>
             <a:r>
-              <a:rPr lang="en-US" sz="1400" dirty="0" smtClean="0">
+              <a:rPr lang="en-US" sz="1700" dirty="0" smtClean="0">
                 <a:latin typeface="Verdana" panose="020B0604030504040204" pitchFamily="34" charset="0"/>
                 <a:ea typeface="Verdana" panose="020B0604030504040204" pitchFamily="34" charset="0"/>
                 <a:cs typeface="Verdana" panose="020B0604030504040204" pitchFamily="34" charset="0"/>
@@ -7989,7 +7741,7 @@
           </a:p>
           <a:p>
             <a:pPr eaLnBrk="1" hangingPunct="1"/>
-            <a:endParaRPr lang="en-US" sz="1400" dirty="0">
+            <a:endParaRPr lang="en-US" sz="1700" dirty="0">
               <a:latin typeface="Verdana" panose="020B0604030504040204" pitchFamily="34" charset="0"/>
               <a:ea typeface="Verdana" panose="020B0604030504040204" pitchFamily="34" charset="0"/>
               <a:cs typeface="Verdana" panose="020B0604030504040204" pitchFamily="34" charset="0"/>
@@ -7998,7 +7750,7 @@
           <a:p>
             <a:pPr eaLnBrk="1" hangingPunct="1"/>
             <a:r>
-              <a:rPr lang="en-US" sz="1400" dirty="0" err="1" smtClean="0">
+              <a:rPr lang="en-US" sz="1700" dirty="0" err="1" smtClean="0">
                 <a:latin typeface="Verdana" panose="020B0604030504040204" pitchFamily="34" charset="0"/>
                 <a:ea typeface="Verdana" panose="020B0604030504040204" pitchFamily="34" charset="0"/>
                 <a:cs typeface="Verdana" panose="020B0604030504040204" pitchFamily="34" charset="0"/>
@@ -8006,7 +7758,7 @@
               <a:t>Hond</a:t>
             </a:r>
             <a:r>
-              <a:rPr lang="en-US" sz="1400" dirty="0" smtClean="0">
+              <a:rPr lang="en-US" sz="1700" dirty="0" smtClean="0">
                 <a:latin typeface="Verdana" panose="020B0604030504040204" pitchFamily="34" charset="0"/>
                 <a:ea typeface="Verdana" panose="020B0604030504040204" pitchFamily="34" charset="0"/>
                 <a:cs typeface="Verdana" panose="020B0604030504040204" pitchFamily="34" charset="0"/>
@@ -8014,7 +7766,7 @@
               <a:t>, D. and </a:t>
             </a:r>
             <a:r>
-              <a:rPr lang="en-US" sz="1400" dirty="0" err="1" smtClean="0">
+              <a:rPr lang="en-US" sz="1700" dirty="0" err="1" smtClean="0">
                 <a:latin typeface="Verdana" panose="020B0604030504040204" pitchFamily="34" charset="0"/>
                 <a:ea typeface="Verdana" panose="020B0604030504040204" pitchFamily="34" charset="0"/>
                 <a:cs typeface="Verdana" panose="020B0604030504040204" pitchFamily="34" charset="0"/>
@@ -8022,7 +7774,7 @@
               <a:t>Spacek</a:t>
             </a:r>
             <a:r>
-              <a:rPr lang="en-US" sz="1400" dirty="0" smtClean="0">
+              <a:rPr lang="en-US" sz="1700" dirty="0" smtClean="0">
                 <a:latin typeface="Verdana" panose="020B0604030504040204" pitchFamily="34" charset="0"/>
                 <a:ea typeface="Verdana" panose="020B0604030504040204" pitchFamily="34" charset="0"/>
                 <a:cs typeface="Verdana" panose="020B0604030504040204" pitchFamily="34" charset="0"/>
@@ -8032,7 +7784,7 @@
           </a:p>
           <a:p>
             <a:pPr eaLnBrk="1" hangingPunct="1"/>
-            <a:endParaRPr lang="en-US" sz="1400" dirty="0">
+            <a:endParaRPr lang="en-US" sz="1700" dirty="0">
               <a:latin typeface="Verdana" panose="020B0604030504040204" pitchFamily="34" charset="0"/>
               <a:ea typeface="Verdana" panose="020B0604030504040204" pitchFamily="34" charset="0"/>
               <a:cs typeface="Verdana" panose="020B0604030504040204" pitchFamily="34" charset="0"/>
@@ -8041,7 +7793,7 @@
           <a:p>
             <a:pPr eaLnBrk="1" hangingPunct="1"/>
             <a:r>
-              <a:rPr lang="en-US" sz="1400" dirty="0" err="1" smtClean="0">
+              <a:rPr lang="en-US" sz="1700" dirty="0" err="1" smtClean="0">
                 <a:latin typeface="Verdana" panose="020B0604030504040204" pitchFamily="34" charset="0"/>
                 <a:ea typeface="Verdana" panose="020B0604030504040204" pitchFamily="34" charset="0"/>
                 <a:cs typeface="Verdana" panose="020B0604030504040204" pitchFamily="34" charset="0"/>
@@ -8049,7 +7801,7 @@
               <a:t>Grgic</a:t>
             </a:r>
             <a:r>
-              <a:rPr lang="en-US" sz="1400" dirty="0" smtClean="0">
+              <a:rPr lang="en-US" sz="1700" dirty="0" smtClean="0">
                 <a:latin typeface="Verdana" panose="020B0604030504040204" pitchFamily="34" charset="0"/>
                 <a:ea typeface="Verdana" panose="020B0604030504040204" pitchFamily="34" charset="0"/>
                 <a:cs typeface="Verdana" panose="020B0604030504040204" pitchFamily="34" charset="0"/>
@@ -8057,7 +7809,7 @@
               <a:t>, M., </a:t>
             </a:r>
             <a:r>
-              <a:rPr lang="en-US" sz="1400" dirty="0" err="1" smtClean="0">
+              <a:rPr lang="en-US" sz="1700" dirty="0" err="1" smtClean="0">
                 <a:latin typeface="Verdana" panose="020B0604030504040204" pitchFamily="34" charset="0"/>
                 <a:ea typeface="Verdana" panose="020B0604030504040204" pitchFamily="34" charset="0"/>
                 <a:cs typeface="Verdana" panose="020B0604030504040204" pitchFamily="34" charset="0"/>
@@ -8065,7 +7817,7 @@
               <a:t>Delac</a:t>
             </a:r>
             <a:r>
-              <a:rPr lang="en-US" sz="1400" dirty="0" smtClean="0">
+              <a:rPr lang="en-US" sz="1700" dirty="0" smtClean="0">
                 <a:latin typeface="Verdana" panose="020B0604030504040204" pitchFamily="34" charset="0"/>
                 <a:ea typeface="Verdana" panose="020B0604030504040204" pitchFamily="34" charset="0"/>
                 <a:cs typeface="Verdana" panose="020B0604030504040204" pitchFamily="34" charset="0"/>
@@ -8073,7 +7825,7 @@
               <a:t>, K. and </a:t>
             </a:r>
             <a:r>
-              <a:rPr lang="en-US" sz="1400" dirty="0" err="1" smtClean="0">
+              <a:rPr lang="en-US" sz="1700" dirty="0" err="1" smtClean="0">
                 <a:latin typeface="Verdana" panose="020B0604030504040204" pitchFamily="34" charset="0"/>
                 <a:ea typeface="Verdana" panose="020B0604030504040204" pitchFamily="34" charset="0"/>
                 <a:cs typeface="Verdana" panose="020B0604030504040204" pitchFamily="34" charset="0"/>
@@ -8081,7 +7833,7 @@
               <a:t>Grgic</a:t>
             </a:r>
             <a:r>
-              <a:rPr lang="en-US" sz="1400" dirty="0" smtClean="0">
+              <a:rPr lang="en-US" sz="1700" dirty="0" smtClean="0">
                 <a:latin typeface="Verdana" panose="020B0604030504040204" pitchFamily="34" charset="0"/>
                 <a:ea typeface="Verdana" panose="020B0604030504040204" pitchFamily="34" charset="0"/>
                 <a:cs typeface="Verdana" panose="020B0604030504040204" pitchFamily="34" charset="0"/>
@@ -8089,7 +7841,7 @@
               <a:t>, S. (2011), ‘</a:t>
             </a:r>
             <a:r>
-              <a:rPr lang="en-US" sz="1400" dirty="0" err="1" smtClean="0">
+              <a:rPr lang="en-US" sz="1700" dirty="0" err="1" smtClean="0">
                 <a:latin typeface="Verdana" panose="020B0604030504040204" pitchFamily="34" charset="0"/>
                 <a:ea typeface="Verdana" panose="020B0604030504040204" pitchFamily="34" charset="0"/>
                 <a:cs typeface="Verdana" panose="020B0604030504040204" pitchFamily="34" charset="0"/>
@@ -8097,7 +7849,7 @@
               <a:t>SCFace</a:t>
             </a:r>
             <a:r>
-              <a:rPr lang="en-US" sz="1400" dirty="0" smtClean="0">
+              <a:rPr lang="en-US" sz="1700" dirty="0" smtClean="0">
                 <a:latin typeface="Verdana" panose="020B0604030504040204" pitchFamily="34" charset="0"/>
                 <a:ea typeface="Verdana" panose="020B0604030504040204" pitchFamily="34" charset="0"/>
                 <a:cs typeface="Verdana" panose="020B0604030504040204" pitchFamily="34" charset="0"/>
@@ -8121,7 +7873,7 @@
         </p:nvSpPr>
         <p:spPr>
           <a:xfrm>
-            <a:off x="20207583" y="32674719"/>
+            <a:off x="20207583" y="30902175"/>
             <a:ext cx="8407576" cy="891547"/>
           </a:xfrm>
           <a:prstGeom prst="rect">
@@ -8195,8 +7947,8 @@
         </p:blipFill>
         <p:spPr>
           <a:xfrm>
-            <a:off x="20207583" y="6240826"/>
-            <a:ext cx="8407578" cy="4706790"/>
+            <a:off x="20178185" y="6220345"/>
+            <a:ext cx="8436974" cy="4706790"/>
           </a:xfrm>
           <a:prstGeom prst="rect">
             <a:avLst/>
@@ -8374,15 +8126,7 @@
                 <a:ea typeface="Verdana" panose="020B0604030504040204" pitchFamily="34" charset="0"/>
                 <a:cs typeface="Verdana" panose="020B0604030504040204" pitchFamily="34" charset="0"/>
               </a:rPr>
-              <a:t>Although the usefulness of social media intelligence has been established, gathering and analysing it may not be as easy as it first appears. </a:t>
-            </a:r>
-            <a:r>
-              <a:rPr lang="en-GB" sz="2800" dirty="0" smtClean="0">
-                <a:latin typeface="Verdana" panose="020B0604030504040204" pitchFamily="34" charset="0"/>
-                <a:ea typeface="Verdana" panose="020B0604030504040204" pitchFamily="34" charset="0"/>
-                <a:cs typeface="Verdana" panose="020B0604030504040204" pitchFamily="34" charset="0"/>
-              </a:rPr>
-              <a:t>The problem for would-be analysts is the sheer amount of data contained within social media platforms – for example, </a:t>
+              <a:t>Although the usefulness of social media intelligence has been established, gathering and analysing it may not be as easy as it first appears. The problem for would-be analysts is the sheer amount of data contained within social media platforms – for example, </a:t>
             </a:r>
             <a:r>
               <a:rPr lang="en-GB" sz="2800" dirty="0">
@@ -8433,11 +8177,6 @@
               </a:rPr>
               <a:t>To find useful information about a single person of interest in such a large data set is extremely challenging. Success rates increase dramatically if some starting point is known, such as a first name, a date of birth, or in this case the person’s face. These factors may also be used in combination to increase accuracy and search speed.</a:t>
             </a:r>
-            <a:endParaRPr lang="en-GB" sz="2800" dirty="0" smtClean="0">
-              <a:latin typeface="Verdana" panose="020B0604030504040204" pitchFamily="34" charset="0"/>
-              <a:ea typeface="Verdana" panose="020B0604030504040204" pitchFamily="34" charset="0"/>
-              <a:cs typeface="Verdana" panose="020B0604030504040204" pitchFamily="34" charset="0"/>
-            </a:endParaRPr>
           </a:p>
         </p:txBody>
       </p:sp>

</xml_diff>

<commit_message>
Removed IR_RGB test as pointless. Made changes to poster
</commit_message>
<xml_diff>
--- a/doc/poster/poster.pptx
+++ b/doc/poster/poster.pptx
@@ -145,7 +145,7 @@
           <p:cNvPr id="2" name="Title 1">
             <a:extLst>
               <a:ext uri="{FF2B5EF4-FFF2-40B4-BE49-F238E27FC236}">
-                <a16:creationId xmlns:a16="http://schemas.microsoft.com/office/drawing/2014/main" xmlns="" id="{02516FE6-5E6F-994A-BF04-FE1535BE7529}"/>
+                <a16:creationId xmlns="" xmlns:a16="http://schemas.microsoft.com/office/drawing/2014/main" id="{02516FE6-5E6F-994A-BF04-FE1535BE7529}"/>
               </a:ext>
             </a:extLst>
           </p:cNvPr>
@@ -183,7 +183,7 @@
           <p:cNvPr id="3" name="Subtitle 2">
             <a:extLst>
               <a:ext uri="{FF2B5EF4-FFF2-40B4-BE49-F238E27FC236}">
-                <a16:creationId xmlns:a16="http://schemas.microsoft.com/office/drawing/2014/main" xmlns="" id="{D718D300-C598-A641-9343-3310D199322B}"/>
+                <a16:creationId xmlns="" xmlns:a16="http://schemas.microsoft.com/office/drawing/2014/main" id="{D718D300-C598-A641-9343-3310D199322B}"/>
               </a:ext>
             </a:extLst>
           </p:cNvPr>
@@ -254,7 +254,7 @@
           <p:cNvPr id="4" name="Date Placeholder 3">
             <a:extLst>
               <a:ext uri="{FF2B5EF4-FFF2-40B4-BE49-F238E27FC236}">
-                <a16:creationId xmlns:a16="http://schemas.microsoft.com/office/drawing/2014/main" xmlns="" id="{C7527FAA-2F55-F443-982D-2D768E99427E}"/>
+                <a16:creationId xmlns="" xmlns:a16="http://schemas.microsoft.com/office/drawing/2014/main" id="{C7527FAA-2F55-F443-982D-2D768E99427E}"/>
               </a:ext>
             </a:extLst>
           </p:cNvPr>
@@ -272,7 +272,7 @@
           <a:p>
             <a:fld id="{985D6BDF-9D0E-4E2B-85B8-D8F4790360C9}" type="datetimeFigureOut">
               <a:rPr lang="en-US" smtClean="0"/>
-              <a:t>4/13/2018</a:t>
+              <a:t>4/14/2018</a:t>
             </a:fld>
             <a:endParaRPr lang="en-US" dirty="0"/>
           </a:p>
@@ -283,7 +283,7 @@
           <p:cNvPr id="5" name="Footer Placeholder 4">
             <a:extLst>
               <a:ext uri="{FF2B5EF4-FFF2-40B4-BE49-F238E27FC236}">
-                <a16:creationId xmlns:a16="http://schemas.microsoft.com/office/drawing/2014/main" xmlns="" id="{BC2812A7-FB98-AA4B-81A6-26BE0FCAA7C6}"/>
+                <a16:creationId xmlns="" xmlns:a16="http://schemas.microsoft.com/office/drawing/2014/main" id="{BC2812A7-FB98-AA4B-81A6-26BE0FCAA7C6}"/>
               </a:ext>
             </a:extLst>
           </p:cNvPr>
@@ -308,7 +308,7 @@
           <p:cNvPr id="6" name="Slide Number Placeholder 5">
             <a:extLst>
               <a:ext uri="{FF2B5EF4-FFF2-40B4-BE49-F238E27FC236}">
-                <a16:creationId xmlns:a16="http://schemas.microsoft.com/office/drawing/2014/main" xmlns="" id="{A79802A0-927E-6441-854A-3E76ACCEC6D9}"/>
+                <a16:creationId xmlns="" xmlns:a16="http://schemas.microsoft.com/office/drawing/2014/main" id="{A79802A0-927E-6441-854A-3E76ACCEC6D9}"/>
               </a:ext>
             </a:extLst>
           </p:cNvPr>
@@ -367,7 +367,7 @@
           <p:cNvPr id="2" name="Title 1">
             <a:extLst>
               <a:ext uri="{FF2B5EF4-FFF2-40B4-BE49-F238E27FC236}">
-                <a16:creationId xmlns:a16="http://schemas.microsoft.com/office/drawing/2014/main" xmlns="" id="{ADC60348-87A2-0846-9CB1-13CC264DA7EC}"/>
+                <a16:creationId xmlns="" xmlns:a16="http://schemas.microsoft.com/office/drawing/2014/main" id="{ADC60348-87A2-0846-9CB1-13CC264DA7EC}"/>
               </a:ext>
             </a:extLst>
           </p:cNvPr>
@@ -396,7 +396,7 @@
           <p:cNvPr id="3" name="Vertical Text Placeholder 2">
             <a:extLst>
               <a:ext uri="{FF2B5EF4-FFF2-40B4-BE49-F238E27FC236}">
-                <a16:creationId xmlns:a16="http://schemas.microsoft.com/office/drawing/2014/main" xmlns="" id="{4EB0F887-92B6-B346-8BF7-A4878DCF0690}"/>
+                <a16:creationId xmlns="" xmlns:a16="http://schemas.microsoft.com/office/drawing/2014/main" id="{4EB0F887-92B6-B346-8BF7-A4878DCF0690}"/>
               </a:ext>
             </a:extLst>
           </p:cNvPr>
@@ -454,7 +454,7 @@
           <p:cNvPr id="4" name="Date Placeholder 3">
             <a:extLst>
               <a:ext uri="{FF2B5EF4-FFF2-40B4-BE49-F238E27FC236}">
-                <a16:creationId xmlns:a16="http://schemas.microsoft.com/office/drawing/2014/main" xmlns="" id="{321C25D9-B58F-B245-B8B3-A97F9EF9B7F5}"/>
+                <a16:creationId xmlns="" xmlns:a16="http://schemas.microsoft.com/office/drawing/2014/main" id="{321C25D9-B58F-B245-B8B3-A97F9EF9B7F5}"/>
               </a:ext>
             </a:extLst>
           </p:cNvPr>
@@ -472,7 +472,7 @@
           <a:p>
             <a:fld id="{985D6BDF-9D0E-4E2B-85B8-D8F4790360C9}" type="datetimeFigureOut">
               <a:rPr lang="en-US" smtClean="0"/>
-              <a:t>4/13/2018</a:t>
+              <a:t>4/14/2018</a:t>
             </a:fld>
             <a:endParaRPr lang="en-US" dirty="0"/>
           </a:p>
@@ -483,7 +483,7 @@
           <p:cNvPr id="5" name="Footer Placeholder 4">
             <a:extLst>
               <a:ext uri="{FF2B5EF4-FFF2-40B4-BE49-F238E27FC236}">
-                <a16:creationId xmlns:a16="http://schemas.microsoft.com/office/drawing/2014/main" xmlns="" id="{D22FDE0A-BC7E-6B49-86D0-ED11150CCDD1}"/>
+                <a16:creationId xmlns="" xmlns:a16="http://schemas.microsoft.com/office/drawing/2014/main" id="{D22FDE0A-BC7E-6B49-86D0-ED11150CCDD1}"/>
               </a:ext>
             </a:extLst>
           </p:cNvPr>
@@ -508,7 +508,7 @@
           <p:cNvPr id="6" name="Slide Number Placeholder 5">
             <a:extLst>
               <a:ext uri="{FF2B5EF4-FFF2-40B4-BE49-F238E27FC236}">
-                <a16:creationId xmlns:a16="http://schemas.microsoft.com/office/drawing/2014/main" xmlns="" id="{878EC080-7CB9-8C40-9DA4-1EBB1FB1D063}"/>
+                <a16:creationId xmlns="" xmlns:a16="http://schemas.microsoft.com/office/drawing/2014/main" id="{878EC080-7CB9-8C40-9DA4-1EBB1FB1D063}"/>
               </a:ext>
             </a:extLst>
           </p:cNvPr>
@@ -567,7 +567,7 @@
           <p:cNvPr id="2" name="Vertical Title 1">
             <a:extLst>
               <a:ext uri="{FF2B5EF4-FFF2-40B4-BE49-F238E27FC236}">
-                <a16:creationId xmlns:a16="http://schemas.microsoft.com/office/drawing/2014/main" xmlns="" id="{CC0031DC-72BF-8A49-9B51-881F56E6D029}"/>
+                <a16:creationId xmlns="" xmlns:a16="http://schemas.microsoft.com/office/drawing/2014/main" id="{CC0031DC-72BF-8A49-9B51-881F56E6D029}"/>
               </a:ext>
             </a:extLst>
           </p:cNvPr>
@@ -601,7 +601,7 @@
           <p:cNvPr id="3" name="Vertical Text Placeholder 2">
             <a:extLst>
               <a:ext uri="{FF2B5EF4-FFF2-40B4-BE49-F238E27FC236}">
-                <a16:creationId xmlns:a16="http://schemas.microsoft.com/office/drawing/2014/main" xmlns="" id="{DDC5DA02-7B93-2F43-8DE6-B483A3441138}"/>
+                <a16:creationId xmlns="" xmlns:a16="http://schemas.microsoft.com/office/drawing/2014/main" id="{DDC5DA02-7B93-2F43-8DE6-B483A3441138}"/>
               </a:ext>
             </a:extLst>
           </p:cNvPr>
@@ -664,7 +664,7 @@
           <p:cNvPr id="4" name="Date Placeholder 3">
             <a:extLst>
               <a:ext uri="{FF2B5EF4-FFF2-40B4-BE49-F238E27FC236}">
-                <a16:creationId xmlns:a16="http://schemas.microsoft.com/office/drawing/2014/main" xmlns="" id="{C51EF0EB-3814-ED4C-A9EC-01FF304E4A94}"/>
+                <a16:creationId xmlns="" xmlns:a16="http://schemas.microsoft.com/office/drawing/2014/main" id="{C51EF0EB-3814-ED4C-A9EC-01FF304E4A94}"/>
               </a:ext>
             </a:extLst>
           </p:cNvPr>
@@ -682,7 +682,7 @@
           <a:p>
             <a:fld id="{985D6BDF-9D0E-4E2B-85B8-D8F4790360C9}" type="datetimeFigureOut">
               <a:rPr lang="en-US" smtClean="0"/>
-              <a:t>4/13/2018</a:t>
+              <a:t>4/14/2018</a:t>
             </a:fld>
             <a:endParaRPr lang="en-US" dirty="0"/>
           </a:p>
@@ -693,7 +693,7 @@
           <p:cNvPr id="5" name="Footer Placeholder 4">
             <a:extLst>
               <a:ext uri="{FF2B5EF4-FFF2-40B4-BE49-F238E27FC236}">
-                <a16:creationId xmlns:a16="http://schemas.microsoft.com/office/drawing/2014/main" xmlns="" id="{1CAC6F94-A19B-BA47-875B-4BB159AEE124}"/>
+                <a16:creationId xmlns="" xmlns:a16="http://schemas.microsoft.com/office/drawing/2014/main" id="{1CAC6F94-A19B-BA47-875B-4BB159AEE124}"/>
               </a:ext>
             </a:extLst>
           </p:cNvPr>
@@ -718,7 +718,7 @@
           <p:cNvPr id="6" name="Slide Number Placeholder 5">
             <a:extLst>
               <a:ext uri="{FF2B5EF4-FFF2-40B4-BE49-F238E27FC236}">
-                <a16:creationId xmlns:a16="http://schemas.microsoft.com/office/drawing/2014/main" xmlns="" id="{574237D9-C941-7C4F-A750-42016B87B7E3}"/>
+                <a16:creationId xmlns="" xmlns:a16="http://schemas.microsoft.com/office/drawing/2014/main" id="{574237D9-C941-7C4F-A750-42016B87B7E3}"/>
               </a:ext>
             </a:extLst>
           </p:cNvPr>
@@ -2341,7 +2341,7 @@
           <p:cNvPr id="2" name="Title 1">
             <a:extLst>
               <a:ext uri="{FF2B5EF4-FFF2-40B4-BE49-F238E27FC236}">
-                <a16:creationId xmlns:a16="http://schemas.microsoft.com/office/drawing/2014/main" xmlns="" id="{C834AFD7-36CC-6D40-B158-24FE830E0E7C}"/>
+                <a16:creationId xmlns="" xmlns:a16="http://schemas.microsoft.com/office/drawing/2014/main" id="{C834AFD7-36CC-6D40-B158-24FE830E0E7C}"/>
               </a:ext>
             </a:extLst>
           </p:cNvPr>
@@ -2370,7 +2370,7 @@
           <p:cNvPr id="3" name="Content Placeholder 2">
             <a:extLst>
               <a:ext uri="{FF2B5EF4-FFF2-40B4-BE49-F238E27FC236}">
-                <a16:creationId xmlns:a16="http://schemas.microsoft.com/office/drawing/2014/main" xmlns="" id="{B80B9F38-468B-4540-9899-D05870035DF1}"/>
+                <a16:creationId xmlns="" xmlns:a16="http://schemas.microsoft.com/office/drawing/2014/main" id="{B80B9F38-468B-4540-9899-D05870035DF1}"/>
               </a:ext>
             </a:extLst>
           </p:cNvPr>
@@ -2428,7 +2428,7 @@
           <p:cNvPr id="4" name="Date Placeholder 3">
             <a:extLst>
               <a:ext uri="{FF2B5EF4-FFF2-40B4-BE49-F238E27FC236}">
-                <a16:creationId xmlns:a16="http://schemas.microsoft.com/office/drawing/2014/main" xmlns="" id="{DAB25082-8C45-2F41-AE5C-055444684480}"/>
+                <a16:creationId xmlns="" xmlns:a16="http://schemas.microsoft.com/office/drawing/2014/main" id="{DAB25082-8C45-2F41-AE5C-055444684480}"/>
               </a:ext>
             </a:extLst>
           </p:cNvPr>
@@ -2446,7 +2446,7 @@
           <a:p>
             <a:fld id="{985D6BDF-9D0E-4E2B-85B8-D8F4790360C9}" type="datetimeFigureOut">
               <a:rPr lang="en-US" smtClean="0"/>
-              <a:t>4/13/2018</a:t>
+              <a:t>4/14/2018</a:t>
             </a:fld>
             <a:endParaRPr lang="en-US" dirty="0"/>
           </a:p>
@@ -2457,7 +2457,7 @@
           <p:cNvPr id="5" name="Footer Placeholder 4">
             <a:extLst>
               <a:ext uri="{FF2B5EF4-FFF2-40B4-BE49-F238E27FC236}">
-                <a16:creationId xmlns:a16="http://schemas.microsoft.com/office/drawing/2014/main" xmlns="" id="{9FCB06C7-36E7-724F-85B7-3DD0082467DF}"/>
+                <a16:creationId xmlns="" xmlns:a16="http://schemas.microsoft.com/office/drawing/2014/main" id="{9FCB06C7-36E7-724F-85B7-3DD0082467DF}"/>
               </a:ext>
             </a:extLst>
           </p:cNvPr>
@@ -2482,7 +2482,7 @@
           <p:cNvPr id="6" name="Slide Number Placeholder 5">
             <a:extLst>
               <a:ext uri="{FF2B5EF4-FFF2-40B4-BE49-F238E27FC236}">
-                <a16:creationId xmlns:a16="http://schemas.microsoft.com/office/drawing/2014/main" xmlns="" id="{14267524-C921-BA4C-888B-1A1944938192}"/>
+                <a16:creationId xmlns="" xmlns:a16="http://schemas.microsoft.com/office/drawing/2014/main" id="{14267524-C921-BA4C-888B-1A1944938192}"/>
               </a:ext>
             </a:extLst>
           </p:cNvPr>
@@ -2541,7 +2541,7 @@
           <p:cNvPr id="2" name="Title 1">
             <a:extLst>
               <a:ext uri="{FF2B5EF4-FFF2-40B4-BE49-F238E27FC236}">
-                <a16:creationId xmlns:a16="http://schemas.microsoft.com/office/drawing/2014/main" xmlns="" id="{3F05BE81-FD43-3D4A-845E-F0196C1CCBA2}"/>
+                <a16:creationId xmlns="" xmlns:a16="http://schemas.microsoft.com/office/drawing/2014/main" id="{3F05BE81-FD43-3D4A-845E-F0196C1CCBA2}"/>
               </a:ext>
             </a:extLst>
           </p:cNvPr>
@@ -2579,7 +2579,7 @@
           <p:cNvPr id="3" name="Text Placeholder 2">
             <a:extLst>
               <a:ext uri="{FF2B5EF4-FFF2-40B4-BE49-F238E27FC236}">
-                <a16:creationId xmlns:a16="http://schemas.microsoft.com/office/drawing/2014/main" xmlns="" id="{6634A983-42D9-9648-B3D3-8FDD557854CF}"/>
+                <a16:creationId xmlns="" xmlns:a16="http://schemas.microsoft.com/office/drawing/2014/main" id="{6634A983-42D9-9648-B3D3-8FDD557854CF}"/>
               </a:ext>
             </a:extLst>
           </p:cNvPr>
@@ -2704,7 +2704,7 @@
           <p:cNvPr id="4" name="Date Placeholder 3">
             <a:extLst>
               <a:ext uri="{FF2B5EF4-FFF2-40B4-BE49-F238E27FC236}">
-                <a16:creationId xmlns:a16="http://schemas.microsoft.com/office/drawing/2014/main" xmlns="" id="{2A6623C5-BA17-0A45-869F-95686ABADF4B}"/>
+                <a16:creationId xmlns="" xmlns:a16="http://schemas.microsoft.com/office/drawing/2014/main" id="{2A6623C5-BA17-0A45-869F-95686ABADF4B}"/>
               </a:ext>
             </a:extLst>
           </p:cNvPr>
@@ -2722,7 +2722,7 @@
           <a:p>
             <a:fld id="{985D6BDF-9D0E-4E2B-85B8-D8F4790360C9}" type="datetimeFigureOut">
               <a:rPr lang="en-US" smtClean="0"/>
-              <a:t>4/13/2018</a:t>
+              <a:t>4/14/2018</a:t>
             </a:fld>
             <a:endParaRPr lang="en-US" dirty="0"/>
           </a:p>
@@ -2733,7 +2733,7 @@
           <p:cNvPr id="5" name="Footer Placeholder 4">
             <a:extLst>
               <a:ext uri="{FF2B5EF4-FFF2-40B4-BE49-F238E27FC236}">
-                <a16:creationId xmlns:a16="http://schemas.microsoft.com/office/drawing/2014/main" xmlns="" id="{D556952D-5903-4644-8C1D-006F5BA1165A}"/>
+                <a16:creationId xmlns="" xmlns:a16="http://schemas.microsoft.com/office/drawing/2014/main" id="{D556952D-5903-4644-8C1D-006F5BA1165A}"/>
               </a:ext>
             </a:extLst>
           </p:cNvPr>
@@ -2758,7 +2758,7 @@
           <p:cNvPr id="6" name="Slide Number Placeholder 5">
             <a:extLst>
               <a:ext uri="{FF2B5EF4-FFF2-40B4-BE49-F238E27FC236}">
-                <a16:creationId xmlns:a16="http://schemas.microsoft.com/office/drawing/2014/main" xmlns="" id="{3C8C1DB5-8EB7-9949-ADEA-7D2B965B6BDD}"/>
+                <a16:creationId xmlns="" xmlns:a16="http://schemas.microsoft.com/office/drawing/2014/main" id="{3C8C1DB5-8EB7-9949-ADEA-7D2B965B6BDD}"/>
               </a:ext>
             </a:extLst>
           </p:cNvPr>
@@ -2817,7 +2817,7 @@
           <p:cNvPr id="2" name="Title 1">
             <a:extLst>
               <a:ext uri="{FF2B5EF4-FFF2-40B4-BE49-F238E27FC236}">
-                <a16:creationId xmlns:a16="http://schemas.microsoft.com/office/drawing/2014/main" xmlns="" id="{46C33F66-82D6-9145-8DD2-355693B59D42}"/>
+                <a16:creationId xmlns="" xmlns:a16="http://schemas.microsoft.com/office/drawing/2014/main" id="{46C33F66-82D6-9145-8DD2-355693B59D42}"/>
               </a:ext>
             </a:extLst>
           </p:cNvPr>
@@ -2846,7 +2846,7 @@
           <p:cNvPr id="3" name="Content Placeholder 2">
             <a:extLst>
               <a:ext uri="{FF2B5EF4-FFF2-40B4-BE49-F238E27FC236}">
-                <a16:creationId xmlns:a16="http://schemas.microsoft.com/office/drawing/2014/main" xmlns="" id="{AD1EE82B-025A-0942-8C71-8681B0CA896C}"/>
+                <a16:creationId xmlns="" xmlns:a16="http://schemas.microsoft.com/office/drawing/2014/main" id="{AD1EE82B-025A-0942-8C71-8681B0CA896C}"/>
               </a:ext>
             </a:extLst>
           </p:cNvPr>
@@ -2909,7 +2909,7 @@
           <p:cNvPr id="4" name="Content Placeholder 3">
             <a:extLst>
               <a:ext uri="{FF2B5EF4-FFF2-40B4-BE49-F238E27FC236}">
-                <a16:creationId xmlns:a16="http://schemas.microsoft.com/office/drawing/2014/main" xmlns="" id="{92C96081-F58A-1A40-99EC-6571EB871B2D}"/>
+                <a16:creationId xmlns="" xmlns:a16="http://schemas.microsoft.com/office/drawing/2014/main" id="{92C96081-F58A-1A40-99EC-6571EB871B2D}"/>
               </a:ext>
             </a:extLst>
           </p:cNvPr>
@@ -2972,7 +2972,7 @@
           <p:cNvPr id="5" name="Date Placeholder 4">
             <a:extLst>
               <a:ext uri="{FF2B5EF4-FFF2-40B4-BE49-F238E27FC236}">
-                <a16:creationId xmlns:a16="http://schemas.microsoft.com/office/drawing/2014/main" xmlns="" id="{61B3AD01-5CE7-1C43-B2B4-DDDBC31D81F8}"/>
+                <a16:creationId xmlns="" xmlns:a16="http://schemas.microsoft.com/office/drawing/2014/main" id="{61B3AD01-5CE7-1C43-B2B4-DDDBC31D81F8}"/>
               </a:ext>
             </a:extLst>
           </p:cNvPr>
@@ -2990,7 +2990,7 @@
           <a:p>
             <a:fld id="{985D6BDF-9D0E-4E2B-85B8-D8F4790360C9}" type="datetimeFigureOut">
               <a:rPr lang="en-US" smtClean="0"/>
-              <a:t>4/13/2018</a:t>
+              <a:t>4/14/2018</a:t>
             </a:fld>
             <a:endParaRPr lang="en-US" dirty="0"/>
           </a:p>
@@ -3001,7 +3001,7 @@
           <p:cNvPr id="6" name="Footer Placeholder 5">
             <a:extLst>
               <a:ext uri="{FF2B5EF4-FFF2-40B4-BE49-F238E27FC236}">
-                <a16:creationId xmlns:a16="http://schemas.microsoft.com/office/drawing/2014/main" xmlns="" id="{EC089A64-6960-914D-BAEE-B7E87C116B2B}"/>
+                <a16:creationId xmlns="" xmlns:a16="http://schemas.microsoft.com/office/drawing/2014/main" id="{EC089A64-6960-914D-BAEE-B7E87C116B2B}"/>
               </a:ext>
             </a:extLst>
           </p:cNvPr>
@@ -3026,7 +3026,7 @@
           <p:cNvPr id="7" name="Slide Number Placeholder 6">
             <a:extLst>
               <a:ext uri="{FF2B5EF4-FFF2-40B4-BE49-F238E27FC236}">
-                <a16:creationId xmlns:a16="http://schemas.microsoft.com/office/drawing/2014/main" xmlns="" id="{401A28F2-CE28-B841-B6AE-F913E7B8689A}"/>
+                <a16:creationId xmlns="" xmlns:a16="http://schemas.microsoft.com/office/drawing/2014/main" id="{401A28F2-CE28-B841-B6AE-F913E7B8689A}"/>
               </a:ext>
             </a:extLst>
           </p:cNvPr>
@@ -3085,7 +3085,7 @@
           <p:cNvPr id="2" name="Title 1">
             <a:extLst>
               <a:ext uri="{FF2B5EF4-FFF2-40B4-BE49-F238E27FC236}">
-                <a16:creationId xmlns:a16="http://schemas.microsoft.com/office/drawing/2014/main" xmlns="" id="{5816C66D-F6A8-9844-9FA3-E2E8DDD14F28}"/>
+                <a16:creationId xmlns="" xmlns:a16="http://schemas.microsoft.com/office/drawing/2014/main" id="{5816C66D-F6A8-9844-9FA3-E2E8DDD14F28}"/>
               </a:ext>
             </a:extLst>
           </p:cNvPr>
@@ -3119,7 +3119,7 @@
           <p:cNvPr id="3" name="Text Placeholder 2">
             <a:extLst>
               <a:ext uri="{FF2B5EF4-FFF2-40B4-BE49-F238E27FC236}">
-                <a16:creationId xmlns:a16="http://schemas.microsoft.com/office/drawing/2014/main" xmlns="" id="{4F6E69C8-16DD-454C-B696-9BF6B68F3754}"/>
+                <a16:creationId xmlns="" xmlns:a16="http://schemas.microsoft.com/office/drawing/2014/main" id="{4F6E69C8-16DD-454C-B696-9BF6B68F3754}"/>
               </a:ext>
             </a:extLst>
           </p:cNvPr>
@@ -3190,7 +3190,7 @@
           <p:cNvPr id="4" name="Content Placeholder 3">
             <a:extLst>
               <a:ext uri="{FF2B5EF4-FFF2-40B4-BE49-F238E27FC236}">
-                <a16:creationId xmlns:a16="http://schemas.microsoft.com/office/drawing/2014/main" xmlns="" id="{8359FDB2-C404-0240-ADDE-590757215234}"/>
+                <a16:creationId xmlns="" xmlns:a16="http://schemas.microsoft.com/office/drawing/2014/main" id="{8359FDB2-C404-0240-ADDE-590757215234}"/>
               </a:ext>
             </a:extLst>
           </p:cNvPr>
@@ -3253,7 +3253,7 @@
           <p:cNvPr id="5" name="Text Placeholder 4">
             <a:extLst>
               <a:ext uri="{FF2B5EF4-FFF2-40B4-BE49-F238E27FC236}">
-                <a16:creationId xmlns:a16="http://schemas.microsoft.com/office/drawing/2014/main" xmlns="" id="{E6B96990-0F73-3945-BF13-09043B4AC324}"/>
+                <a16:creationId xmlns="" xmlns:a16="http://schemas.microsoft.com/office/drawing/2014/main" id="{E6B96990-0F73-3945-BF13-09043B4AC324}"/>
               </a:ext>
             </a:extLst>
           </p:cNvPr>
@@ -3324,7 +3324,7 @@
           <p:cNvPr id="6" name="Content Placeholder 5">
             <a:extLst>
               <a:ext uri="{FF2B5EF4-FFF2-40B4-BE49-F238E27FC236}">
-                <a16:creationId xmlns:a16="http://schemas.microsoft.com/office/drawing/2014/main" xmlns="" id="{1EC3D7C3-DDC5-D249-9CA2-865143F35FF6}"/>
+                <a16:creationId xmlns="" xmlns:a16="http://schemas.microsoft.com/office/drawing/2014/main" id="{1EC3D7C3-DDC5-D249-9CA2-865143F35FF6}"/>
               </a:ext>
             </a:extLst>
           </p:cNvPr>
@@ -3387,7 +3387,7 @@
           <p:cNvPr id="7" name="Date Placeholder 6">
             <a:extLst>
               <a:ext uri="{FF2B5EF4-FFF2-40B4-BE49-F238E27FC236}">
-                <a16:creationId xmlns:a16="http://schemas.microsoft.com/office/drawing/2014/main" xmlns="" id="{F468364C-68DD-7B49-BA6B-1E58CC8D7F8A}"/>
+                <a16:creationId xmlns="" xmlns:a16="http://schemas.microsoft.com/office/drawing/2014/main" id="{F468364C-68DD-7B49-BA6B-1E58CC8D7F8A}"/>
               </a:ext>
             </a:extLst>
           </p:cNvPr>
@@ -3405,7 +3405,7 @@
           <a:p>
             <a:fld id="{985D6BDF-9D0E-4E2B-85B8-D8F4790360C9}" type="datetimeFigureOut">
               <a:rPr lang="en-US" smtClean="0"/>
-              <a:t>4/13/2018</a:t>
+              <a:t>4/14/2018</a:t>
             </a:fld>
             <a:endParaRPr lang="en-US" dirty="0"/>
           </a:p>
@@ -3416,7 +3416,7 @@
           <p:cNvPr id="8" name="Footer Placeholder 7">
             <a:extLst>
               <a:ext uri="{FF2B5EF4-FFF2-40B4-BE49-F238E27FC236}">
-                <a16:creationId xmlns:a16="http://schemas.microsoft.com/office/drawing/2014/main" xmlns="" id="{605D129A-91BE-354F-A1AD-572FCCBF5DB7}"/>
+                <a16:creationId xmlns="" xmlns:a16="http://schemas.microsoft.com/office/drawing/2014/main" id="{605D129A-91BE-354F-A1AD-572FCCBF5DB7}"/>
               </a:ext>
             </a:extLst>
           </p:cNvPr>
@@ -3441,7 +3441,7 @@
           <p:cNvPr id="9" name="Slide Number Placeholder 8">
             <a:extLst>
               <a:ext uri="{FF2B5EF4-FFF2-40B4-BE49-F238E27FC236}">
-                <a16:creationId xmlns:a16="http://schemas.microsoft.com/office/drawing/2014/main" xmlns="" id="{120ADA68-2232-1E49-A6D5-55EF390E1DD9}"/>
+                <a16:creationId xmlns="" xmlns:a16="http://schemas.microsoft.com/office/drawing/2014/main" id="{120ADA68-2232-1E49-A6D5-55EF390E1DD9}"/>
               </a:ext>
             </a:extLst>
           </p:cNvPr>
@@ -3500,7 +3500,7 @@
           <p:cNvPr id="2" name="Title 1">
             <a:extLst>
               <a:ext uri="{FF2B5EF4-FFF2-40B4-BE49-F238E27FC236}">
-                <a16:creationId xmlns:a16="http://schemas.microsoft.com/office/drawing/2014/main" xmlns="" id="{146F912A-DCC9-1B41-9EB2-EBF4AABCD63C}"/>
+                <a16:creationId xmlns="" xmlns:a16="http://schemas.microsoft.com/office/drawing/2014/main" id="{146F912A-DCC9-1B41-9EB2-EBF4AABCD63C}"/>
               </a:ext>
             </a:extLst>
           </p:cNvPr>
@@ -3529,7 +3529,7 @@
           <p:cNvPr id="3" name="Date Placeholder 2">
             <a:extLst>
               <a:ext uri="{FF2B5EF4-FFF2-40B4-BE49-F238E27FC236}">
-                <a16:creationId xmlns:a16="http://schemas.microsoft.com/office/drawing/2014/main" xmlns="" id="{68878506-779F-3D4D-BCC1-5BD5742D0F34}"/>
+                <a16:creationId xmlns="" xmlns:a16="http://schemas.microsoft.com/office/drawing/2014/main" id="{68878506-779F-3D4D-BCC1-5BD5742D0F34}"/>
               </a:ext>
             </a:extLst>
           </p:cNvPr>
@@ -3547,7 +3547,7 @@
           <a:p>
             <a:fld id="{985D6BDF-9D0E-4E2B-85B8-D8F4790360C9}" type="datetimeFigureOut">
               <a:rPr lang="en-US" smtClean="0"/>
-              <a:t>4/13/2018</a:t>
+              <a:t>4/14/2018</a:t>
             </a:fld>
             <a:endParaRPr lang="en-US" dirty="0"/>
           </a:p>
@@ -3558,7 +3558,7 @@
           <p:cNvPr id="4" name="Footer Placeholder 3">
             <a:extLst>
               <a:ext uri="{FF2B5EF4-FFF2-40B4-BE49-F238E27FC236}">
-                <a16:creationId xmlns:a16="http://schemas.microsoft.com/office/drawing/2014/main" xmlns="" id="{4AB20F24-8FCB-DF46-9A38-FBBA71E08E1D}"/>
+                <a16:creationId xmlns="" xmlns:a16="http://schemas.microsoft.com/office/drawing/2014/main" id="{4AB20F24-8FCB-DF46-9A38-FBBA71E08E1D}"/>
               </a:ext>
             </a:extLst>
           </p:cNvPr>
@@ -3583,7 +3583,7 @@
           <p:cNvPr id="5" name="Slide Number Placeholder 4">
             <a:extLst>
               <a:ext uri="{FF2B5EF4-FFF2-40B4-BE49-F238E27FC236}">
-                <a16:creationId xmlns:a16="http://schemas.microsoft.com/office/drawing/2014/main" xmlns="" id="{C0454651-48D2-5E42-9A00-64A6C3CC3E8F}"/>
+                <a16:creationId xmlns="" xmlns:a16="http://schemas.microsoft.com/office/drawing/2014/main" id="{C0454651-48D2-5E42-9A00-64A6C3CC3E8F}"/>
               </a:ext>
             </a:extLst>
           </p:cNvPr>
@@ -3642,7 +3642,7 @@
           <p:cNvPr id="2" name="Date Placeholder 1">
             <a:extLst>
               <a:ext uri="{FF2B5EF4-FFF2-40B4-BE49-F238E27FC236}">
-                <a16:creationId xmlns:a16="http://schemas.microsoft.com/office/drawing/2014/main" xmlns="" id="{9FF9D351-633A-7B4B-9617-EF879D3299BD}"/>
+                <a16:creationId xmlns="" xmlns:a16="http://schemas.microsoft.com/office/drawing/2014/main" id="{9FF9D351-633A-7B4B-9617-EF879D3299BD}"/>
               </a:ext>
             </a:extLst>
           </p:cNvPr>
@@ -3660,7 +3660,7 @@
           <a:p>
             <a:fld id="{985D6BDF-9D0E-4E2B-85B8-D8F4790360C9}" type="datetimeFigureOut">
               <a:rPr lang="en-US" smtClean="0"/>
-              <a:t>4/13/2018</a:t>
+              <a:t>4/14/2018</a:t>
             </a:fld>
             <a:endParaRPr lang="en-US" dirty="0"/>
           </a:p>
@@ -3671,7 +3671,7 @@
           <p:cNvPr id="3" name="Footer Placeholder 2">
             <a:extLst>
               <a:ext uri="{FF2B5EF4-FFF2-40B4-BE49-F238E27FC236}">
-                <a16:creationId xmlns:a16="http://schemas.microsoft.com/office/drawing/2014/main" xmlns="" id="{3FB83984-5A3D-0A48-83AE-5F416132929A}"/>
+                <a16:creationId xmlns="" xmlns:a16="http://schemas.microsoft.com/office/drawing/2014/main" id="{3FB83984-5A3D-0A48-83AE-5F416132929A}"/>
               </a:ext>
             </a:extLst>
           </p:cNvPr>
@@ -3696,7 +3696,7 @@
           <p:cNvPr id="4" name="Slide Number Placeholder 3">
             <a:extLst>
               <a:ext uri="{FF2B5EF4-FFF2-40B4-BE49-F238E27FC236}">
-                <a16:creationId xmlns:a16="http://schemas.microsoft.com/office/drawing/2014/main" xmlns="" id="{3A92A9E4-D212-2647-B07F-108019D79C5B}"/>
+                <a16:creationId xmlns="" xmlns:a16="http://schemas.microsoft.com/office/drawing/2014/main" id="{3A92A9E4-D212-2647-B07F-108019D79C5B}"/>
               </a:ext>
             </a:extLst>
           </p:cNvPr>
@@ -3755,7 +3755,7 @@
           <p:cNvPr id="2" name="Title 1">
             <a:extLst>
               <a:ext uri="{FF2B5EF4-FFF2-40B4-BE49-F238E27FC236}">
-                <a16:creationId xmlns:a16="http://schemas.microsoft.com/office/drawing/2014/main" xmlns="" id="{6C00C5DC-938C-F04D-9393-9C09FDAC7609}"/>
+                <a16:creationId xmlns="" xmlns:a16="http://schemas.microsoft.com/office/drawing/2014/main" id="{6C00C5DC-938C-F04D-9393-9C09FDAC7609}"/>
               </a:ext>
             </a:extLst>
           </p:cNvPr>
@@ -3793,7 +3793,7 @@
           <p:cNvPr id="3" name="Content Placeholder 2">
             <a:extLst>
               <a:ext uri="{FF2B5EF4-FFF2-40B4-BE49-F238E27FC236}">
-                <a16:creationId xmlns:a16="http://schemas.microsoft.com/office/drawing/2014/main" xmlns="" id="{9F66B026-0600-9C42-B651-72B005F6BC62}"/>
+                <a16:creationId xmlns="" xmlns:a16="http://schemas.microsoft.com/office/drawing/2014/main" id="{9F66B026-0600-9C42-B651-72B005F6BC62}"/>
               </a:ext>
             </a:extLst>
           </p:cNvPr>
@@ -3884,7 +3884,7 @@
           <p:cNvPr id="4" name="Text Placeholder 3">
             <a:extLst>
               <a:ext uri="{FF2B5EF4-FFF2-40B4-BE49-F238E27FC236}">
-                <a16:creationId xmlns:a16="http://schemas.microsoft.com/office/drawing/2014/main" xmlns="" id="{49287B73-94F7-3D46-81CD-C8276B348ACD}"/>
+                <a16:creationId xmlns="" xmlns:a16="http://schemas.microsoft.com/office/drawing/2014/main" id="{49287B73-94F7-3D46-81CD-C8276B348ACD}"/>
               </a:ext>
             </a:extLst>
           </p:cNvPr>
@@ -3955,7 +3955,7 @@
           <p:cNvPr id="5" name="Date Placeholder 4">
             <a:extLst>
               <a:ext uri="{FF2B5EF4-FFF2-40B4-BE49-F238E27FC236}">
-                <a16:creationId xmlns:a16="http://schemas.microsoft.com/office/drawing/2014/main" xmlns="" id="{59CBFCC9-FF27-2C4B-BCFF-898721C880FE}"/>
+                <a16:creationId xmlns="" xmlns:a16="http://schemas.microsoft.com/office/drawing/2014/main" id="{59CBFCC9-FF27-2C4B-BCFF-898721C880FE}"/>
               </a:ext>
             </a:extLst>
           </p:cNvPr>
@@ -3973,7 +3973,7 @@
           <a:p>
             <a:fld id="{985D6BDF-9D0E-4E2B-85B8-D8F4790360C9}" type="datetimeFigureOut">
               <a:rPr lang="en-US" smtClean="0"/>
-              <a:t>4/13/2018</a:t>
+              <a:t>4/14/2018</a:t>
             </a:fld>
             <a:endParaRPr lang="en-US" dirty="0"/>
           </a:p>
@@ -3984,7 +3984,7 @@
           <p:cNvPr id="6" name="Footer Placeholder 5">
             <a:extLst>
               <a:ext uri="{FF2B5EF4-FFF2-40B4-BE49-F238E27FC236}">
-                <a16:creationId xmlns:a16="http://schemas.microsoft.com/office/drawing/2014/main" xmlns="" id="{363C70E3-F619-A543-B8D0-B850025C803C}"/>
+                <a16:creationId xmlns="" xmlns:a16="http://schemas.microsoft.com/office/drawing/2014/main" id="{363C70E3-F619-A543-B8D0-B850025C803C}"/>
               </a:ext>
             </a:extLst>
           </p:cNvPr>
@@ -4009,7 +4009,7 @@
           <p:cNvPr id="7" name="Slide Number Placeholder 6">
             <a:extLst>
               <a:ext uri="{FF2B5EF4-FFF2-40B4-BE49-F238E27FC236}">
-                <a16:creationId xmlns:a16="http://schemas.microsoft.com/office/drawing/2014/main" xmlns="" id="{003D6C45-D9E0-8046-AB06-507E97C4CF47}"/>
+                <a16:creationId xmlns="" xmlns:a16="http://schemas.microsoft.com/office/drawing/2014/main" id="{003D6C45-D9E0-8046-AB06-507E97C4CF47}"/>
               </a:ext>
             </a:extLst>
           </p:cNvPr>
@@ -4068,7 +4068,7 @@
           <p:cNvPr id="2" name="Title 1">
             <a:extLst>
               <a:ext uri="{FF2B5EF4-FFF2-40B4-BE49-F238E27FC236}">
-                <a16:creationId xmlns:a16="http://schemas.microsoft.com/office/drawing/2014/main" xmlns="" id="{9E37D833-D882-FA46-88D5-744EBD312C2B}"/>
+                <a16:creationId xmlns="" xmlns:a16="http://schemas.microsoft.com/office/drawing/2014/main" id="{9E37D833-D882-FA46-88D5-744EBD312C2B}"/>
               </a:ext>
             </a:extLst>
           </p:cNvPr>
@@ -4106,7 +4106,7 @@
           <p:cNvPr id="3" name="Picture Placeholder 2">
             <a:extLst>
               <a:ext uri="{FF2B5EF4-FFF2-40B4-BE49-F238E27FC236}">
-                <a16:creationId xmlns:a16="http://schemas.microsoft.com/office/drawing/2014/main" xmlns="" id="{59BCC681-4456-9241-B033-893882762FBD}"/>
+                <a16:creationId xmlns="" xmlns:a16="http://schemas.microsoft.com/office/drawing/2014/main" id="{59BCC681-4456-9241-B033-893882762FBD}"/>
               </a:ext>
             </a:extLst>
           </p:cNvPr>
@@ -4177,7 +4177,7 @@
           <p:cNvPr id="4" name="Text Placeholder 3">
             <a:extLst>
               <a:ext uri="{FF2B5EF4-FFF2-40B4-BE49-F238E27FC236}">
-                <a16:creationId xmlns:a16="http://schemas.microsoft.com/office/drawing/2014/main" xmlns="" id="{42638F79-9896-B54E-9111-892AEA057FB2}"/>
+                <a16:creationId xmlns="" xmlns:a16="http://schemas.microsoft.com/office/drawing/2014/main" id="{42638F79-9896-B54E-9111-892AEA057FB2}"/>
               </a:ext>
             </a:extLst>
           </p:cNvPr>
@@ -4248,7 +4248,7 @@
           <p:cNvPr id="5" name="Date Placeholder 4">
             <a:extLst>
               <a:ext uri="{FF2B5EF4-FFF2-40B4-BE49-F238E27FC236}">
-                <a16:creationId xmlns:a16="http://schemas.microsoft.com/office/drawing/2014/main" xmlns="" id="{3328B9BE-DDCE-8F49-80D7-54EC35B87B8F}"/>
+                <a16:creationId xmlns="" xmlns:a16="http://schemas.microsoft.com/office/drawing/2014/main" id="{3328B9BE-DDCE-8F49-80D7-54EC35B87B8F}"/>
               </a:ext>
             </a:extLst>
           </p:cNvPr>
@@ -4266,7 +4266,7 @@
           <a:p>
             <a:fld id="{985D6BDF-9D0E-4E2B-85B8-D8F4790360C9}" type="datetimeFigureOut">
               <a:rPr lang="en-US" smtClean="0"/>
-              <a:t>4/13/2018</a:t>
+              <a:t>4/14/2018</a:t>
             </a:fld>
             <a:endParaRPr lang="en-US" dirty="0"/>
           </a:p>
@@ -4277,7 +4277,7 @@
           <p:cNvPr id="6" name="Footer Placeholder 5">
             <a:extLst>
               <a:ext uri="{FF2B5EF4-FFF2-40B4-BE49-F238E27FC236}">
-                <a16:creationId xmlns:a16="http://schemas.microsoft.com/office/drawing/2014/main" xmlns="" id="{A887F430-4424-4D4D-8930-8CDF3E375A55}"/>
+                <a16:creationId xmlns="" xmlns:a16="http://schemas.microsoft.com/office/drawing/2014/main" id="{A887F430-4424-4D4D-8930-8CDF3E375A55}"/>
               </a:ext>
             </a:extLst>
           </p:cNvPr>
@@ -4302,7 +4302,7 @@
           <p:cNvPr id="7" name="Slide Number Placeholder 6">
             <a:extLst>
               <a:ext uri="{FF2B5EF4-FFF2-40B4-BE49-F238E27FC236}">
-                <a16:creationId xmlns:a16="http://schemas.microsoft.com/office/drawing/2014/main" xmlns="" id="{67EB447C-F52D-0B41-B819-8F840FA57A36}"/>
+                <a16:creationId xmlns="" xmlns:a16="http://schemas.microsoft.com/office/drawing/2014/main" id="{67EB447C-F52D-0B41-B819-8F840FA57A36}"/>
               </a:ext>
             </a:extLst>
           </p:cNvPr>
@@ -4366,7 +4366,7 @@
           <p:cNvPr id="2" name="Title Placeholder 1">
             <a:extLst>
               <a:ext uri="{FF2B5EF4-FFF2-40B4-BE49-F238E27FC236}">
-                <a16:creationId xmlns:a16="http://schemas.microsoft.com/office/drawing/2014/main" xmlns="" id="{3E5F3B3C-EA66-714E-96F6-323266DDD008}"/>
+                <a16:creationId xmlns="" xmlns:a16="http://schemas.microsoft.com/office/drawing/2014/main" id="{3E5F3B3C-EA66-714E-96F6-323266DDD008}"/>
               </a:ext>
             </a:extLst>
           </p:cNvPr>
@@ -4405,7 +4405,7 @@
           <p:cNvPr id="3" name="Text Placeholder 2">
             <a:extLst>
               <a:ext uri="{FF2B5EF4-FFF2-40B4-BE49-F238E27FC236}">
-                <a16:creationId xmlns:a16="http://schemas.microsoft.com/office/drawing/2014/main" xmlns="" id="{CB454DBF-12F1-6647-89EE-204D19032B3C}"/>
+                <a16:creationId xmlns="" xmlns:a16="http://schemas.microsoft.com/office/drawing/2014/main" id="{CB454DBF-12F1-6647-89EE-204D19032B3C}"/>
               </a:ext>
             </a:extLst>
           </p:cNvPr>
@@ -4472,7 +4472,7 @@
           <p:cNvPr id="4" name="Date Placeholder 3">
             <a:extLst>
               <a:ext uri="{FF2B5EF4-FFF2-40B4-BE49-F238E27FC236}">
-                <a16:creationId xmlns:a16="http://schemas.microsoft.com/office/drawing/2014/main" xmlns="" id="{2E3137EF-0753-9644-A06B-394DFED2E723}"/>
+                <a16:creationId xmlns="" xmlns:a16="http://schemas.microsoft.com/office/drawing/2014/main" id="{2E3137EF-0753-9644-A06B-394DFED2E723}"/>
               </a:ext>
             </a:extLst>
           </p:cNvPr>
@@ -4508,7 +4508,7 @@
           <a:p>
             <a:fld id="{985D6BDF-9D0E-4E2B-85B8-D8F4790360C9}" type="datetimeFigureOut">
               <a:rPr lang="en-US" smtClean="0"/>
-              <a:t>4/13/2018</a:t>
+              <a:t>4/14/2018</a:t>
             </a:fld>
             <a:endParaRPr lang="en-US" dirty="0"/>
           </a:p>
@@ -4519,7 +4519,7 @@
           <p:cNvPr id="5" name="Footer Placeholder 4">
             <a:extLst>
               <a:ext uri="{FF2B5EF4-FFF2-40B4-BE49-F238E27FC236}">
-                <a16:creationId xmlns:a16="http://schemas.microsoft.com/office/drawing/2014/main" xmlns="" id="{EB420708-7B0C-E04E-9070-77A33BBF710B}"/>
+                <a16:creationId xmlns="" xmlns:a16="http://schemas.microsoft.com/office/drawing/2014/main" id="{EB420708-7B0C-E04E-9070-77A33BBF710B}"/>
               </a:ext>
             </a:extLst>
           </p:cNvPr>
@@ -4562,7 +4562,7 @@
           <p:cNvPr id="6" name="Slide Number Placeholder 5">
             <a:extLst>
               <a:ext uri="{FF2B5EF4-FFF2-40B4-BE49-F238E27FC236}">
-                <a16:creationId xmlns:a16="http://schemas.microsoft.com/office/drawing/2014/main" xmlns="" id="{3093D907-58C2-F043-83BC-1855C6D57CE5}"/>
+                <a16:creationId xmlns="" xmlns:a16="http://schemas.microsoft.com/office/drawing/2014/main" id="{3093D907-58C2-F043-83BC-1855C6D57CE5}"/>
               </a:ext>
             </a:extLst>
           </p:cNvPr>
@@ -4914,16 +4914,22 @@
   <p:cSld>
     <p:bg>
       <p:bgPr>
-        <a:blipFill dpi="0" rotWithShape="1">
-          <a:blip r:embed="rId2">
-            <a:alphaModFix amt="20000"/>
-            <a:lum/>
-          </a:blip>
-          <a:srcRect/>
-          <a:stretch>
-            <a:fillRect l="-3000" r="-3000"/>
-          </a:stretch>
-        </a:blipFill>
+        <a:gradFill>
+          <a:gsLst>
+            <a:gs pos="0">
+              <a:schemeClr val="bg1"/>
+            </a:gs>
+            <a:gs pos="82000">
+              <a:srgbClr val="D3D3D3"/>
+            </a:gs>
+            <a:gs pos="100000">
+              <a:schemeClr val="bg1">
+                <a:lumMod val="65000"/>
+              </a:schemeClr>
+            </a:gs>
+          </a:gsLst>
+          <a:lin ang="5400000" scaled="0"/>
+        </a:gradFill>
         <a:effectLst/>
       </p:bgPr>
     </p:bg>
@@ -4943,10 +4949,10 @@
       </p:grpSpPr>
       <p:sp>
         <p:nvSpPr>
-          <p:cNvPr id="23" name="Rectangle 22">
+          <p:cNvPr id="37" name="Rectangle 36">
             <a:extLst>
               <a:ext uri="{FF2B5EF4-FFF2-40B4-BE49-F238E27FC236}">
-                <a16:creationId xmlns:a16="http://schemas.microsoft.com/office/drawing/2014/main" xmlns="" id="{6478113D-4E66-304C-8773-209D1BBC4A1C}"/>
+                <a16:creationId xmlns="" xmlns:a16="http://schemas.microsoft.com/office/drawing/2014/main" id="{CD61824E-C355-EF4F-822E-DD3B6B63BAD9}"/>
               </a:ext>
             </a:extLst>
           </p:cNvPr>
@@ -4955,8 +4961,8 @@
         </p:nvSpPr>
         <p:spPr>
           <a:xfrm>
-            <a:off x="0" y="0"/>
-            <a:ext cx="30267275" cy="5360658"/>
+            <a:off x="-1" y="106930"/>
+            <a:ext cx="30267275" cy="4308659"/>
           </a:xfrm>
           <a:prstGeom prst="rect">
             <a:avLst/>
@@ -4964,6 +4970,9 @@
           <a:solidFill>
             <a:srgbClr val="660066"/>
           </a:solidFill>
+          <a:ln>
+            <a:noFill/>
+          </a:ln>
         </p:spPr>
         <p:style>
           <a:lnRef idx="2">
@@ -4986,7 +4995,59 @@
           <a:lstStyle/>
           <a:p>
             <a:pPr algn="ctr"/>
-            <a:endParaRPr lang="en-US"/>
+            <a:endParaRPr lang="en-US" dirty="0"/>
+          </a:p>
+        </p:txBody>
+      </p:sp>
+      <p:sp>
+        <p:nvSpPr>
+          <p:cNvPr id="46" name="Rectangle 45">
+            <a:extLst>
+              <a:ext uri="{FF2B5EF4-FFF2-40B4-BE49-F238E27FC236}">
+                <a16:creationId xmlns="" xmlns:a16="http://schemas.microsoft.com/office/drawing/2014/main" id="{CD61824E-C355-EF4F-822E-DD3B6B63BAD9}"/>
+              </a:ext>
+            </a:extLst>
+          </p:cNvPr>
+          <p:cNvSpPr/>
+          <p:nvPr/>
+        </p:nvSpPr>
+        <p:spPr>
+          <a:xfrm>
+            <a:off x="0" y="39754080"/>
+            <a:ext cx="30267275" cy="3076405"/>
+          </a:xfrm>
+          <a:prstGeom prst="rect">
+            <a:avLst/>
+          </a:prstGeom>
+          <a:solidFill>
+            <a:srgbClr val="212529"/>
+          </a:solidFill>
+          <a:ln>
+            <a:noFill/>
+          </a:ln>
+        </p:spPr>
+        <p:style>
+          <a:lnRef idx="2">
+            <a:schemeClr val="accent1">
+              <a:shade val="50000"/>
+            </a:schemeClr>
+          </a:lnRef>
+          <a:fillRef idx="1">
+            <a:schemeClr val="accent1"/>
+          </a:fillRef>
+          <a:effectRef idx="0">
+            <a:schemeClr val="accent1"/>
+          </a:effectRef>
+          <a:fontRef idx="minor">
+            <a:schemeClr val="lt1"/>
+          </a:fontRef>
+        </p:style>
+        <p:txBody>
+          <a:bodyPr rtlCol="0" anchor="ctr"/>
+          <a:lstStyle/>
+          <a:p>
+            <a:pPr algn="ctr"/>
+            <a:endParaRPr lang="en-US" dirty="0"/>
           </a:p>
         </p:txBody>
       </p:sp>
@@ -5006,21 +5067,11 @@
           <a:prstGeom prst="rect">
             <a:avLst/>
           </a:prstGeom>
-          <a:solidFill>
-            <a:schemeClr val="bg1"/>
-          </a:solidFill>
+          <a:noFill/>
           <a:ln w="12700">
-            <a:solidFill>
-              <a:srgbClr val="660066"/>
-            </a:solidFill>
+            <a:noFill/>
           </a:ln>
-          <a:effectLst>
-            <a:outerShdw blurRad="50800" dist="38100" dir="2700000" algn="tl" rotWithShape="0">
-              <a:prstClr val="black">
-                <a:alpha val="40000"/>
-              </a:prstClr>
-            </a:outerShdw>
-          </a:effectLst>
+          <a:effectLst/>
         </p:spPr>
         <p:txBody>
           <a:bodyPr lIns="173940" tIns="173940" rIns="173940" bIns="173940">
@@ -5125,7 +5176,7 @@
             </a:lvl9pPr>
           </a:lstStyle>
           <a:p>
-            <a:pPr eaLnBrk="1" hangingPunct="1"/>
+            <a:pPr algn="just" eaLnBrk="1" hangingPunct="1"/>
             <a:r>
               <a:rPr lang="en-US" sz="2800" dirty="0" smtClean="0">
                 <a:latin typeface="Verdana" panose="020B0604030504040204" pitchFamily="34" charset="0"/>
@@ -5136,7 +5187,7 @@
             </a:r>
           </a:p>
           <a:p>
-            <a:pPr eaLnBrk="1" hangingPunct="1"/>
+            <a:pPr algn="just" eaLnBrk="1" hangingPunct="1"/>
             <a:endParaRPr lang="en-US" sz="2800" dirty="0">
               <a:latin typeface="Verdana" panose="020B0604030504040204" pitchFamily="34" charset="0"/>
               <a:ea typeface="Verdana" panose="020B0604030504040204" pitchFamily="34" charset="0"/>
@@ -5144,7 +5195,7 @@
             </a:endParaRPr>
           </a:p>
           <a:p>
-            <a:pPr eaLnBrk="1" hangingPunct="1"/>
+            <a:pPr algn="just" eaLnBrk="1" hangingPunct="1"/>
             <a:r>
               <a:rPr lang="en-US" sz="2800" dirty="0" smtClean="0">
                 <a:latin typeface="Verdana" panose="020B0604030504040204" pitchFamily="34" charset="0"/>
@@ -5210,10 +5261,7 @@
             <a:r>
               <a:rPr lang="en-US" sz="5400" b="1" dirty="0">
                 <a:solidFill>
-                  <a:schemeClr val="accent3">
-                    <a:lumMod val="20000"/>
-                    <a:lumOff val="80000"/>
-                  </a:schemeClr>
+                  <a:schemeClr val="bg1"/>
                 </a:solidFill>
               </a:rPr>
               <a:t>Abstract</a:t>
@@ -5231,29 +5279,17 @@
         </p:nvSpPr>
         <p:spPr bwMode="auto">
           <a:xfrm>
-            <a:off x="10929850" y="25309403"/>
+            <a:off x="10929850" y="25885467"/>
             <a:ext cx="8407576" cy="11618029"/>
           </a:xfrm>
           <a:prstGeom prst="rect">
             <a:avLst/>
           </a:prstGeom>
-          <a:solidFill>
-            <a:schemeClr val="bg1"/>
-          </a:solidFill>
+          <a:noFill/>
           <a:ln w="12700">
-            <a:solidFill>
-              <a:schemeClr val="accent1">
-                <a:lumMod val="75000"/>
-              </a:schemeClr>
-            </a:solidFill>
+            <a:noFill/>
           </a:ln>
-          <a:effectLst>
-            <a:outerShdw blurRad="50800" dist="38100" dir="2700000" algn="tl" rotWithShape="0">
-              <a:prstClr val="black">
-                <a:alpha val="40000"/>
-              </a:prstClr>
-            </a:outerShdw>
-          </a:effectLst>
+          <a:effectLst/>
         </p:spPr>
         <p:txBody>
           <a:bodyPr lIns="173940" tIns="173940" rIns="173940" bIns="173940">
@@ -5358,7 +5394,7 @@
             </a:lvl9pPr>
           </a:lstStyle>
           <a:p>
-            <a:pPr eaLnBrk="1" hangingPunct="1"/>
+            <a:pPr algn="just" eaLnBrk="1" hangingPunct="1"/>
             <a:r>
               <a:rPr lang="en-US" sz="2800" dirty="0" smtClean="0">
                 <a:latin typeface="Verdana" panose="020B0604030504040204" pitchFamily="34" charset="0"/>
@@ -5369,7 +5405,7 @@
             </a:r>
           </a:p>
           <a:p>
-            <a:pPr eaLnBrk="1" hangingPunct="1"/>
+            <a:pPr algn="just" eaLnBrk="1" hangingPunct="1"/>
             <a:endParaRPr lang="en-US" sz="2800" dirty="0">
               <a:latin typeface="Verdana" panose="020B0604030504040204" pitchFamily="34" charset="0"/>
               <a:ea typeface="Verdana" panose="020B0604030504040204" pitchFamily="34" charset="0"/>
@@ -5377,7 +5413,7 @@
             </a:endParaRPr>
           </a:p>
           <a:p>
-            <a:pPr eaLnBrk="1" hangingPunct="1"/>
+            <a:pPr algn="just" eaLnBrk="1" hangingPunct="1"/>
             <a:r>
               <a:rPr lang="en-US" sz="2800" dirty="0" smtClean="0">
                 <a:latin typeface="Verdana" panose="020B0604030504040204" pitchFamily="34" charset="0"/>
@@ -5388,7 +5424,7 @@
             </a:r>
           </a:p>
           <a:p>
-            <a:pPr eaLnBrk="1" hangingPunct="1"/>
+            <a:pPr algn="just" eaLnBrk="1" hangingPunct="1"/>
             <a:endParaRPr lang="en-US" sz="2800" dirty="0">
               <a:latin typeface="Verdana" panose="020B0604030504040204" pitchFamily="34" charset="0"/>
               <a:ea typeface="Verdana" panose="020B0604030504040204" pitchFamily="34" charset="0"/>
@@ -5396,7 +5432,7 @@
             </a:endParaRPr>
           </a:p>
           <a:p>
-            <a:pPr eaLnBrk="1" hangingPunct="1"/>
+            <a:pPr algn="just" eaLnBrk="1" hangingPunct="1"/>
             <a:r>
               <a:rPr lang="en-US" sz="2800" dirty="0" smtClean="0">
                 <a:latin typeface="Verdana" panose="020B0604030504040204" pitchFamily="34" charset="0"/>
@@ -5419,31 +5455,7 @@
                 <a:ea typeface="Verdana" panose="020B0604030504040204" pitchFamily="34" charset="0"/>
                 <a:cs typeface="Verdana" panose="020B0604030504040204" pitchFamily="34" charset="0"/>
               </a:rPr>
-              <a:t> data set with the infra-red images produced </a:t>
-            </a:r>
-            <a:r>
-              <a:rPr lang="en-US" sz="2800" dirty="0" smtClean="0">
-                <a:latin typeface="Verdana" panose="020B0604030504040204" pitchFamily="34" charset="0"/>
-                <a:ea typeface="Verdana" panose="020B0604030504040204" pitchFamily="34" charset="0"/>
-                <a:cs typeface="Verdana" panose="020B0604030504040204" pitchFamily="34" charset="0"/>
-              </a:rPr>
-              <a:t>much worse results.</a:t>
-            </a:r>
-            <a:r>
-              <a:rPr lang="en-US" sz="2800" dirty="0" smtClean="0">
-                <a:latin typeface="Verdana" panose="020B0604030504040204" pitchFamily="34" charset="0"/>
-                <a:ea typeface="Verdana" panose="020B0604030504040204" pitchFamily="34" charset="0"/>
-                <a:cs typeface="Verdana" panose="020B0604030504040204" pitchFamily="34" charset="0"/>
-              </a:rPr>
-              <a:t> While the original image was always compared with a distance of 0, </a:t>
-            </a:r>
-            <a:r>
-              <a:rPr lang="en-US" sz="2800" dirty="0" smtClean="0">
-                <a:latin typeface="Verdana" panose="020B0604030504040204" pitchFamily="34" charset="0"/>
-                <a:ea typeface="Verdana" panose="020B0604030504040204" pitchFamily="34" charset="0"/>
-                <a:cs typeface="Verdana" panose="020B0604030504040204" pitchFamily="34" charset="0"/>
-              </a:rPr>
-              <a:t>the accuracy was negatively impacted by the presence of several false positives. It is </a:t>
+              <a:t> data set with the infra-red images produced much worse results. While the original image was always compared with a distance of 0, the accuracy was negatively impacted by the presence of several false positives. It is </a:t>
             </a:r>
             <a:r>
               <a:rPr lang="en-US" sz="2800" dirty="0" err="1" smtClean="0">
@@ -5493,7 +5505,7 @@
         </p:nvSpPr>
         <p:spPr>
           <a:xfrm>
-            <a:off x="1681515" y="16493613"/>
+            <a:off x="1681515" y="16853653"/>
             <a:ext cx="8407576" cy="891547"/>
           </a:xfrm>
           <a:prstGeom prst="rect">
@@ -5534,10 +5546,7 @@
             <a:r>
               <a:rPr lang="en-US" sz="5400" b="1" dirty="0">
                 <a:solidFill>
-                  <a:schemeClr val="accent3">
-                    <a:lumMod val="20000"/>
-                    <a:lumOff val="80000"/>
-                  </a:schemeClr>
+                  <a:schemeClr val="bg1"/>
                 </a:solidFill>
               </a:rPr>
               <a:t>Introduction</a:t>
@@ -5561,21 +5570,11 @@
           <a:prstGeom prst="rect">
             <a:avLst/>
           </a:prstGeom>
-          <a:solidFill>
-            <a:schemeClr val="bg1"/>
-          </a:solidFill>
+          <a:noFill/>
           <a:ln w="12700">
-            <a:solidFill>
-              <a:srgbClr val="660066"/>
-            </a:solidFill>
+            <a:noFill/>
           </a:ln>
-          <a:effectLst>
-            <a:outerShdw blurRad="50800" dist="38100" dir="2700000" algn="tl" rotWithShape="0">
-              <a:prstClr val="black">
-                <a:alpha val="40000"/>
-              </a:prstClr>
-            </a:outerShdw>
-          </a:effectLst>
+          <a:effectLst/>
         </p:spPr>
         <p:txBody>
           <a:bodyPr lIns="173940" tIns="173940" rIns="173940" bIns="173940">
@@ -5680,7 +5679,7 @@
             </a:lvl9pPr>
           </a:lstStyle>
           <a:p>
-            <a:pPr eaLnBrk="1" hangingPunct="1"/>
+            <a:pPr algn="just" eaLnBrk="1" hangingPunct="1"/>
             <a:r>
               <a:rPr lang="en-US" sz="2800" dirty="0" smtClean="0">
                 <a:latin typeface="Verdana" panose="020B0604030504040204" pitchFamily="34" charset="0"/>
@@ -5811,7 +5810,7 @@
             </a:r>
           </a:p>
           <a:p>
-            <a:pPr eaLnBrk="1" hangingPunct="1"/>
+            <a:pPr algn="just" eaLnBrk="1" hangingPunct="1"/>
             <a:endParaRPr lang="en-US" sz="2800" dirty="0">
               <a:latin typeface="Verdana" panose="020B0604030504040204" pitchFamily="34" charset="0"/>
               <a:ea typeface="Verdana" panose="020B0604030504040204" pitchFamily="34" charset="0"/>
@@ -5819,7 +5818,7 @@
             </a:endParaRPr>
           </a:p>
           <a:p>
-            <a:pPr eaLnBrk="1" hangingPunct="1"/>
+            <a:pPr algn="just" eaLnBrk="1" hangingPunct="1"/>
             <a:r>
               <a:rPr lang="en-US" sz="2800" dirty="0" smtClean="0">
                 <a:latin typeface="Verdana" panose="020B0604030504040204" pitchFamily="34" charset="0"/>
@@ -5873,10 +5872,7 @@
             <a:r>
               <a:rPr lang="en-US" sz="5400" b="1" dirty="0">
                 <a:solidFill>
-                  <a:schemeClr val="accent3">
-                    <a:lumMod val="20000"/>
-                    <a:lumOff val="80000"/>
-                  </a:schemeClr>
+                  <a:schemeClr val="bg1"/>
                 </a:solidFill>
               </a:rPr>
               <a:t>Methods and Materials</a:t>
@@ -5894,27 +5890,17 @@
         </p:nvSpPr>
         <p:spPr bwMode="auto">
           <a:xfrm>
-            <a:off x="20178184" y="13988584"/>
-            <a:ext cx="8407576" cy="16509547"/>
+            <a:off x="20178184" y="14276616"/>
+            <a:ext cx="8407576" cy="17155878"/>
           </a:xfrm>
           <a:prstGeom prst="rect">
             <a:avLst/>
           </a:prstGeom>
-          <a:solidFill>
-            <a:schemeClr val="bg1"/>
-          </a:solidFill>
+          <a:noFill/>
           <a:ln w="12700">
-            <a:solidFill>
-              <a:srgbClr val="660066"/>
-            </a:solidFill>
+            <a:noFill/>
           </a:ln>
-          <a:effectLst>
-            <a:outerShdw blurRad="50800" dist="38100" dir="2700000" algn="tl" rotWithShape="0">
-              <a:prstClr val="black">
-                <a:alpha val="40000"/>
-              </a:prstClr>
-            </a:outerShdw>
-          </a:effectLst>
+          <a:effectLst/>
         </p:spPr>
         <p:txBody>
           <a:bodyPr lIns="173940" tIns="173940" rIns="173940" bIns="173940">
@@ -6019,60 +6005,76 @@
             </a:lvl9pPr>
           </a:lstStyle>
           <a:p>
-            <a:pPr eaLnBrk="1" hangingPunct="1"/>
-            <a:r>
-              <a:rPr lang="en-US" sz="3000" dirty="0" smtClean="0">
-                <a:latin typeface="Calibri" pitchFamily="34" charset="0"/>
+            <a:pPr algn="just" eaLnBrk="1" hangingPunct="1"/>
+            <a:r>
+              <a:rPr lang="en-US" sz="2800" dirty="0" smtClean="0">
+                <a:latin typeface="Verdana" panose="020B0604030504040204" pitchFamily="34" charset="0"/>
+                <a:ea typeface="Verdana" panose="020B0604030504040204" pitchFamily="34" charset="0"/>
+                <a:cs typeface="Verdana" panose="020B0604030504040204" pitchFamily="34" charset="0"/>
               </a:rPr>
               <a:t>The program implemented shows that, yes, it is possible to use facial recognition to assist in the gathering and analysis of social media intelligence. The automation of this task could be greatly beneficial to intelligence services, private firms wishing to gather intelligence, or private citizens wishing to see their SOCMINT footprint. There are however several caveats:</a:t>
             </a:r>
           </a:p>
           <a:p>
-            <a:pPr eaLnBrk="1" hangingPunct="1"/>
-            <a:endParaRPr lang="en-US" sz="3000" dirty="0">
-              <a:latin typeface="Calibri" pitchFamily="34" charset="0"/>
+            <a:pPr algn="just" eaLnBrk="1" hangingPunct="1"/>
+            <a:endParaRPr lang="en-US" sz="2800" dirty="0">
+              <a:latin typeface="Verdana" panose="020B0604030504040204" pitchFamily="34" charset="0"/>
+              <a:ea typeface="Verdana" panose="020B0604030504040204" pitchFamily="34" charset="0"/>
+              <a:cs typeface="Verdana" panose="020B0604030504040204" pitchFamily="34" charset="0"/>
             </a:endParaRPr>
           </a:p>
           <a:p>
-            <a:pPr eaLnBrk="1" hangingPunct="1"/>
-            <a:r>
-              <a:rPr lang="en-US" sz="3000" dirty="0" smtClean="0">
-                <a:latin typeface="Calibri" pitchFamily="34" charset="0"/>
+            <a:pPr algn="just" eaLnBrk="1" hangingPunct="1"/>
+            <a:r>
+              <a:rPr lang="en-US" sz="2800" dirty="0" smtClean="0">
+                <a:latin typeface="Verdana" panose="020B0604030504040204" pitchFamily="34" charset="0"/>
+                <a:ea typeface="Verdana" panose="020B0604030504040204" pitchFamily="34" charset="0"/>
+                <a:cs typeface="Verdana" panose="020B0604030504040204" pitchFamily="34" charset="0"/>
               </a:rPr>
               <a:t>While testing showed promising results in terms of accuracy, the time taken for each search is excessive. The program can undoubtedly search large data sets faster than a human could, but having searches last over an hour over a small data set (in comparison to all profile photos on a social networking service) means that it is unlikely to be able to scale well.</a:t>
             </a:r>
           </a:p>
           <a:p>
-            <a:pPr eaLnBrk="1" hangingPunct="1"/>
-            <a:endParaRPr lang="en-US" sz="3000" dirty="0">
-              <a:latin typeface="Calibri" pitchFamily="34" charset="0"/>
+            <a:pPr algn="just" eaLnBrk="1" hangingPunct="1"/>
+            <a:endParaRPr lang="en-US" sz="2800" dirty="0">
+              <a:latin typeface="Verdana" panose="020B0604030504040204" pitchFamily="34" charset="0"/>
+              <a:ea typeface="Verdana" panose="020B0604030504040204" pitchFamily="34" charset="0"/>
+              <a:cs typeface="Verdana" panose="020B0604030504040204" pitchFamily="34" charset="0"/>
             </a:endParaRPr>
           </a:p>
           <a:p>
-            <a:pPr eaLnBrk="1" hangingPunct="1"/>
-            <a:r>
-              <a:rPr lang="en-US" sz="3000" dirty="0" smtClean="0">
-                <a:latin typeface="Calibri" pitchFamily="34" charset="0"/>
+            <a:pPr algn="just" eaLnBrk="1" hangingPunct="1"/>
+            <a:r>
+              <a:rPr lang="en-US" sz="2800" dirty="0" smtClean="0">
+                <a:latin typeface="Verdana" panose="020B0604030504040204" pitchFamily="34" charset="0"/>
+                <a:ea typeface="Verdana" panose="020B0604030504040204" pitchFamily="34" charset="0"/>
+                <a:cs typeface="Verdana" panose="020B0604030504040204" pitchFamily="34" charset="0"/>
               </a:rPr>
               <a:t>As a corollary, since the time taken for each search is so long only limited testing could be performed. It is likely that the 100% accuracy rating achieved over the tests is close to the true accuracy that the program could achieve, the small sample size of tests makes it difficult to say this definitively.</a:t>
             </a:r>
           </a:p>
           <a:p>
-            <a:pPr eaLnBrk="1" hangingPunct="1"/>
-            <a:endParaRPr lang="en-US" sz="3000" dirty="0">
-              <a:latin typeface="Calibri" pitchFamily="34" charset="0"/>
+            <a:pPr algn="just" eaLnBrk="1" hangingPunct="1"/>
+            <a:endParaRPr lang="en-US" sz="2800" dirty="0">
+              <a:latin typeface="Verdana" panose="020B0604030504040204" pitchFamily="34" charset="0"/>
+              <a:ea typeface="Verdana" panose="020B0604030504040204" pitchFamily="34" charset="0"/>
+              <a:cs typeface="Verdana" panose="020B0604030504040204" pitchFamily="34" charset="0"/>
             </a:endParaRPr>
           </a:p>
           <a:p>
-            <a:pPr eaLnBrk="1" hangingPunct="1"/>
-            <a:r>
-              <a:rPr lang="en-US" sz="3000" dirty="0" smtClean="0">
-                <a:latin typeface="Calibri" pitchFamily="34" charset="0"/>
+            <a:pPr algn="just" eaLnBrk="1" hangingPunct="1"/>
+            <a:r>
+              <a:rPr lang="en-US" sz="2800" dirty="0" smtClean="0">
+                <a:latin typeface="Verdana" panose="020B0604030504040204" pitchFamily="34" charset="0"/>
+                <a:ea typeface="Verdana" panose="020B0604030504040204" pitchFamily="34" charset="0"/>
+                <a:cs typeface="Verdana" panose="020B0604030504040204" pitchFamily="34" charset="0"/>
               </a:rPr>
               <a:t>Finally, the service this program provides may not be accessible to all. Using it against a real social network rather than a test data set would require setting up a proxy server to present data in the expected manner, as well as having the service in question allow access to the full (or at least, a sizeable portion) collection of profile images. This is feasible for security services and large corporations but is likely outside the scope of what a single person could acquire.</a:t>
             </a:r>
-            <a:endParaRPr lang="en-US" sz="3000" dirty="0">
-              <a:latin typeface="Calibri" pitchFamily="34" charset="0"/>
+            <a:endParaRPr lang="en-US" sz="2800" dirty="0">
+              <a:latin typeface="Verdana" panose="020B0604030504040204" pitchFamily="34" charset="0"/>
+              <a:ea typeface="Verdana" panose="020B0604030504040204" pitchFamily="34" charset="0"/>
+              <a:cs typeface="Verdana" panose="020B0604030504040204" pitchFamily="34" charset="0"/>
             </a:endParaRPr>
           </a:p>
         </p:txBody>
@@ -6085,7 +6087,7 @@
         </p:nvSpPr>
         <p:spPr>
           <a:xfrm>
-            <a:off x="20178184" y="13044191"/>
+            <a:off x="20178184" y="13332223"/>
             <a:ext cx="8407576" cy="891547"/>
           </a:xfrm>
           <a:prstGeom prst="rect">
@@ -6126,10 +6128,7 @@
             <a:r>
               <a:rPr lang="en-US" sz="5400" b="1" dirty="0">
                 <a:solidFill>
-                  <a:schemeClr val="accent3">
-                    <a:lumMod val="20000"/>
-                    <a:lumOff val="80000"/>
-                  </a:schemeClr>
+                  <a:schemeClr val="bg1"/>
                 </a:solidFill>
               </a:rPr>
               <a:t>Conclusions</a:t>
@@ -6147,27 +6146,17 @@
         </p:nvSpPr>
         <p:spPr bwMode="auto">
           <a:xfrm>
-            <a:off x="1681515" y="17385160"/>
+            <a:off x="1681515" y="17745200"/>
             <a:ext cx="8407576" cy="5091036"/>
           </a:xfrm>
           <a:prstGeom prst="rect">
             <a:avLst/>
           </a:prstGeom>
-          <a:solidFill>
-            <a:schemeClr val="bg1"/>
-          </a:solidFill>
+          <a:noFill/>
           <a:ln w="12700">
-            <a:solidFill>
-              <a:srgbClr val="660066"/>
-            </a:solidFill>
+            <a:noFill/>
           </a:ln>
-          <a:effectLst>
-            <a:outerShdw blurRad="50800" dist="38100" dir="2700000" algn="tl" rotWithShape="0">
-              <a:prstClr val="black">
-                <a:alpha val="40000"/>
-              </a:prstClr>
-            </a:outerShdw>
-          </a:effectLst>
+          <a:effectLst/>
         </p:spPr>
         <p:txBody>
           <a:bodyPr lIns="173940" tIns="173940" rIns="173940" bIns="173940">
@@ -6272,6 +6261,7 @@
             </a:lvl9pPr>
           </a:lstStyle>
           <a:p>
+            <a:pPr algn="just"/>
             <a:r>
               <a:rPr lang="en-GB" sz="2800" dirty="0" smtClean="0">
                 <a:latin typeface="Verdana" panose="020B0604030504040204" pitchFamily="34" charset="0"/>
@@ -6339,7 +6329,7 @@
         </p:nvSpPr>
         <p:spPr>
           <a:xfrm>
-            <a:off x="10929850" y="24417857"/>
+            <a:off x="10929850" y="24993921"/>
             <a:ext cx="8407576" cy="891547"/>
           </a:xfrm>
           <a:prstGeom prst="rect">
@@ -6380,10 +6370,7 @@
             <a:r>
               <a:rPr lang="en-US" sz="5400" b="1" dirty="0">
                 <a:solidFill>
-                  <a:schemeClr val="accent3">
-                    <a:lumMod val="20000"/>
-                    <a:lumOff val="80000"/>
-                  </a:schemeClr>
+                  <a:schemeClr val="bg1"/>
                 </a:solidFill>
               </a:rPr>
               <a:t>Results</a:t>
@@ -6401,7 +6388,7 @@
         </p:nvSpPr>
         <p:spPr bwMode="auto">
           <a:xfrm>
-            <a:off x="1681515" y="27017986"/>
+            <a:off x="1681515" y="27474112"/>
             <a:ext cx="8407576" cy="1195815"/>
           </a:xfrm>
           <a:prstGeom prst="rect">
@@ -6579,7 +6566,7 @@
         </p:nvSpPr>
         <p:spPr bwMode="auto">
           <a:xfrm>
-            <a:off x="10929848" y="23291437"/>
+            <a:off x="10929848" y="23651477"/>
             <a:ext cx="8407578" cy="826483"/>
           </a:xfrm>
           <a:prstGeom prst="rect">
@@ -6927,196 +6914,6 @@
       </p:sp>
       <p:sp>
         <p:nvSpPr>
-          <p:cNvPr id="46" name="Rectangle 45">
-            <a:extLst>
-              <a:ext uri="{FF2B5EF4-FFF2-40B4-BE49-F238E27FC236}">
-                <a16:creationId xmlns:a16="http://schemas.microsoft.com/office/drawing/2014/main" xmlns="" id="{CD61824E-C355-EF4F-822E-DD3B6B63BAD9}"/>
-              </a:ext>
-            </a:extLst>
-          </p:cNvPr>
-          <p:cNvSpPr/>
-          <p:nvPr/>
-        </p:nvSpPr>
-        <p:spPr>
-          <a:xfrm>
-            <a:off x="0" y="38521826"/>
-            <a:ext cx="30267275" cy="4308659"/>
-          </a:xfrm>
-          <a:prstGeom prst="rect">
-            <a:avLst/>
-          </a:prstGeom>
-          <a:solidFill>
-            <a:schemeClr val="bg1"/>
-          </a:solidFill>
-          <a:ln>
-            <a:noFill/>
-          </a:ln>
-        </p:spPr>
-        <p:style>
-          <a:lnRef idx="2">
-            <a:schemeClr val="accent1">
-              <a:shade val="50000"/>
-            </a:schemeClr>
-          </a:lnRef>
-          <a:fillRef idx="1">
-            <a:schemeClr val="accent1"/>
-          </a:fillRef>
-          <a:effectRef idx="0">
-            <a:schemeClr val="accent1"/>
-          </a:effectRef>
-          <a:fontRef idx="minor">
-            <a:schemeClr val="lt1"/>
-          </a:fontRef>
-        </p:style>
-        <p:txBody>
-          <a:bodyPr rtlCol="0" anchor="ctr"/>
-          <a:lstStyle/>
-          <a:p>
-            <a:pPr algn="ctr"/>
-            <a:endParaRPr lang="en-US" dirty="0"/>
-          </a:p>
-        </p:txBody>
-      </p:sp>
-      <p:sp>
-        <p:nvSpPr>
-          <p:cNvPr id="47" name="Rectangle 46">
-            <a:extLst>
-              <a:ext uri="{FF2B5EF4-FFF2-40B4-BE49-F238E27FC236}">
-                <a16:creationId xmlns:a16="http://schemas.microsoft.com/office/drawing/2014/main" xmlns="" id="{C17EBBF8-D799-4F49-968F-FF8A5BBA88C0}"/>
-              </a:ext>
-            </a:extLst>
-          </p:cNvPr>
-          <p:cNvSpPr/>
-          <p:nvPr/>
-        </p:nvSpPr>
-        <p:spPr>
-          <a:xfrm>
-            <a:off x="0" y="37403087"/>
-            <a:ext cx="30267275" cy="1098458"/>
-          </a:xfrm>
-          <a:prstGeom prst="rect">
-            <a:avLst/>
-          </a:prstGeom>
-          <a:solidFill>
-            <a:srgbClr val="660066"/>
-          </a:solidFill>
-          <a:ln>
-            <a:noFill/>
-          </a:ln>
-        </p:spPr>
-        <p:style>
-          <a:lnRef idx="2">
-            <a:schemeClr val="accent1">
-              <a:shade val="50000"/>
-            </a:schemeClr>
-          </a:lnRef>
-          <a:fillRef idx="1">
-            <a:schemeClr val="accent1"/>
-          </a:fillRef>
-          <a:effectRef idx="0">
-            <a:schemeClr val="accent1"/>
-          </a:effectRef>
-          <a:fontRef idx="minor">
-            <a:schemeClr val="lt1"/>
-          </a:fontRef>
-        </p:style>
-        <p:txBody>
-          <a:bodyPr rtlCol="0" anchor="ctr"/>
-          <a:lstStyle/>
-          <a:p>
-            <a:pPr algn="ctr"/>
-            <a:endParaRPr lang="en-US"/>
-          </a:p>
-        </p:txBody>
-      </p:sp>
-      <p:pic>
-        <p:nvPicPr>
-          <p:cNvPr id="38" name="Picture 37">
-            <a:extLst>
-              <a:ext uri="{FF2B5EF4-FFF2-40B4-BE49-F238E27FC236}">
-                <a16:creationId xmlns:a16="http://schemas.microsoft.com/office/drawing/2014/main" xmlns="" id="{7DB2E886-014F-BB4C-9EB3-207936EEBC64}"/>
-              </a:ext>
-            </a:extLst>
-          </p:cNvPr>
-          <p:cNvPicPr>
-            <a:picLocks noChangeAspect="1"/>
-          </p:cNvPicPr>
-          <p:nvPr/>
-        </p:nvPicPr>
-        <p:blipFill>
-          <a:blip r:embed="rId3"/>
-          <a:stretch>
-            <a:fillRect/>
-          </a:stretch>
-        </p:blipFill>
-        <p:spPr>
-          <a:xfrm>
-            <a:off x="8341834" y="38521826"/>
-            <a:ext cx="13051116" cy="4061826"/>
-          </a:xfrm>
-          <a:prstGeom prst="rect">
-            <a:avLst/>
-          </a:prstGeom>
-        </p:spPr>
-      </p:pic>
-      <p:sp>
-        <p:nvSpPr>
-          <p:cNvPr id="28" name="Rectangle 27">
-            <a:extLst>
-              <a:ext uri="{FF2B5EF4-FFF2-40B4-BE49-F238E27FC236}">
-                <a16:creationId xmlns:a16="http://schemas.microsoft.com/office/drawing/2014/main" xmlns="" id="{8166EAD4-FED8-214A-88DB-A5BBB6101451}"/>
-              </a:ext>
-            </a:extLst>
-          </p:cNvPr>
-          <p:cNvSpPr/>
-          <p:nvPr/>
-        </p:nvSpPr>
-        <p:spPr>
-          <a:xfrm>
-            <a:off x="1858929" y="881163"/>
-            <a:ext cx="26756229" cy="3545330"/>
-          </a:xfrm>
-          <a:prstGeom prst="rect">
-            <a:avLst/>
-          </a:prstGeom>
-          <a:solidFill>
-            <a:schemeClr val="bg1"/>
-          </a:solidFill>
-          <a:effectLst>
-            <a:outerShdw blurRad="50800" dist="38100" dir="2700000" algn="tl" rotWithShape="0">
-              <a:prstClr val="black">
-                <a:alpha val="40000"/>
-              </a:prstClr>
-            </a:outerShdw>
-          </a:effectLst>
-        </p:spPr>
-        <p:style>
-          <a:lnRef idx="2">
-            <a:schemeClr val="accent1">
-              <a:shade val="50000"/>
-            </a:schemeClr>
-          </a:lnRef>
-          <a:fillRef idx="1">
-            <a:schemeClr val="accent1"/>
-          </a:fillRef>
-          <a:effectRef idx="0">
-            <a:schemeClr val="accent1"/>
-          </a:effectRef>
-          <a:fontRef idx="minor">
-            <a:schemeClr val="lt1"/>
-          </a:fontRef>
-        </p:style>
-        <p:txBody>
-          <a:bodyPr rtlCol="0" anchor="ctr"/>
-          <a:lstStyle/>
-          <a:p>
-            <a:pPr algn="ctr"/>
-            <a:endParaRPr lang="en-US"/>
-          </a:p>
-        </p:txBody>
-      </p:sp>
-      <p:sp>
-        <p:nvSpPr>
           <p:cNvPr id="4" name="Text Box 122"/>
           <p:cNvSpPr txBox="1">
             <a:spLocks noChangeArrowheads="1"/>
@@ -7125,8 +6922,8 @@
         </p:nvSpPr>
         <p:spPr bwMode="auto">
           <a:xfrm>
-            <a:off x="4604587" y="466944"/>
-            <a:ext cx="21117102" cy="3217295"/>
+            <a:off x="458214" y="535651"/>
+            <a:ext cx="29365055" cy="3340406"/>
           </a:xfrm>
           <a:prstGeom prst="rect">
             <a:avLst/>
@@ -7166,7 +6963,7 @@
           </a:extLst>
         </p:spPr>
         <p:txBody>
-          <a:bodyPr lIns="173940" tIns="434850" rIns="173940" bIns="434850" anchor="ctr" anchorCtr="0">
+          <a:bodyPr wrap="square" lIns="173940" tIns="434850" rIns="173940" bIns="434850" anchor="ctr" anchorCtr="0">
             <a:spAutoFit/>
           </a:bodyPr>
           <a:lstStyle>
@@ -7270,25 +7067,19 @@
           <a:p>
             <a:pPr algn="ctr" eaLnBrk="1" hangingPunct="1"/>
             <a:r>
-              <a:rPr lang="en-US" sz="7600" b="1" dirty="0" smtClean="0">
-                <a:solidFill>
-                  <a:schemeClr val="tx1">
-                    <a:lumMod val="85000"/>
-                    <a:lumOff val="15000"/>
-                  </a:schemeClr>
+              <a:rPr lang="en-US" sz="8000" b="1" spc="-300" dirty="0" smtClean="0">
+                <a:solidFill>
+                  <a:schemeClr val="bg1"/>
                 </a:solidFill>
                 <a:latin typeface="Verdana" panose="020B0604030504040204" pitchFamily="34" charset="0"/>
                 <a:ea typeface="Verdana" panose="020B0604030504040204" pitchFamily="34" charset="0"/>
                 <a:cs typeface="Verdana" panose="020B0604030504040204" pitchFamily="34" charset="0"/>
               </a:rPr>
-              <a:t>Using Facial Recognition to Gather Social Media Intelligence</a:t>
-            </a:r>
-            <a:endParaRPr lang="en-US" sz="7600" b="1" dirty="0">
+              <a:t>USING FACIAL RECOGNITION TO GATHER SOCIAL MEDIA INTELLIGENCE</a:t>
+            </a:r>
+            <a:endParaRPr lang="en-US" sz="8000" b="1" spc="-300" dirty="0">
               <a:solidFill>
-                <a:schemeClr val="tx1">
-                  <a:lumMod val="85000"/>
-                  <a:lumOff val="15000"/>
-                </a:schemeClr>
+                <a:schemeClr val="bg1"/>
               </a:solidFill>
               <a:latin typeface="Verdana" panose="020B0604030504040204" pitchFamily="34" charset="0"/>
               <a:ea typeface="Verdana" panose="020B0604030504040204" pitchFamily="34" charset="0"/>
@@ -7307,7 +7098,7 @@
         </p:nvSpPr>
         <p:spPr bwMode="auto">
           <a:xfrm>
-            <a:off x="4639098" y="2423319"/>
+            <a:off x="16429781" y="40571336"/>
             <a:ext cx="21117102" cy="2228867"/>
           </a:xfrm>
           <a:prstGeom prst="rect">
@@ -7452,7 +7243,7 @@
             <a:r>
               <a:rPr lang="en-US" sz="4600" dirty="0" smtClean="0">
                 <a:solidFill>
-                  <a:sysClr val="windowText" lastClr="000000"/>
+                  <a:schemeClr val="bg1"/>
                 </a:solidFill>
                 <a:latin typeface="+mn-lt"/>
               </a:rPr>
@@ -7460,7 +7251,7 @@
             </a:r>
             <a:endParaRPr lang="en-US" sz="4600" dirty="0">
               <a:solidFill>
-                <a:sysClr val="windowText" lastClr="000000"/>
+                <a:schemeClr val="bg1"/>
               </a:solidFill>
               <a:latin typeface="+mn-lt"/>
             </a:endParaRPr>
@@ -7472,7 +7263,7 @@
           <p:cNvPr id="55" name="Text Box 193">
             <a:extLst>
               <a:ext uri="{FF2B5EF4-FFF2-40B4-BE49-F238E27FC236}">
-                <a16:creationId xmlns:a16="http://schemas.microsoft.com/office/drawing/2014/main" xmlns="" id="{656A4183-5026-334C-B883-5517F347C31D}"/>
+                <a16:creationId xmlns="" xmlns:a16="http://schemas.microsoft.com/office/drawing/2014/main" id="{656A4183-5026-334C-B883-5517F347C31D}"/>
               </a:ext>
             </a:extLst>
           </p:cNvPr>
@@ -7483,27 +7274,17 @@
         </p:nvSpPr>
         <p:spPr bwMode="auto">
           <a:xfrm>
-            <a:off x="20207583" y="31786476"/>
+            <a:off x="20207583" y="32601979"/>
             <a:ext cx="8407576" cy="5140956"/>
           </a:xfrm>
           <a:prstGeom prst="rect">
             <a:avLst/>
           </a:prstGeom>
-          <a:solidFill>
-            <a:schemeClr val="bg1"/>
-          </a:solidFill>
+          <a:noFill/>
           <a:ln w="12700">
-            <a:solidFill>
-              <a:srgbClr val="660066"/>
-            </a:solidFill>
+            <a:noFill/>
           </a:ln>
-          <a:effectLst>
-            <a:outerShdw blurRad="50800" dist="38100" dir="2700000" algn="tl" rotWithShape="0">
-              <a:prstClr val="black">
-                <a:alpha val="40000"/>
-              </a:prstClr>
-            </a:outerShdw>
-          </a:effectLst>
+          <a:effectLst/>
         </p:spPr>
         <p:txBody>
           <a:bodyPr lIns="173940" tIns="173940" rIns="173940" bIns="173940">
@@ -7608,7 +7389,7 @@
             </a:lvl9pPr>
           </a:lstStyle>
           <a:p>
-            <a:pPr eaLnBrk="1" hangingPunct="1"/>
+            <a:pPr algn="just" eaLnBrk="1" hangingPunct="1"/>
             <a:r>
               <a:rPr lang="en-US" sz="1700" dirty="0" smtClean="0">
                 <a:latin typeface="Verdana" panose="020B0604030504040204" pitchFamily="34" charset="0"/>
@@ -7619,7 +7400,7 @@
             </a:r>
           </a:p>
           <a:p>
-            <a:pPr eaLnBrk="1" hangingPunct="1"/>
+            <a:pPr algn="just" eaLnBrk="1" hangingPunct="1"/>
             <a:endParaRPr lang="en-US" sz="1700" dirty="0">
               <a:latin typeface="Verdana" panose="020B0604030504040204" pitchFamily="34" charset="0"/>
               <a:ea typeface="Verdana" panose="020B0604030504040204" pitchFamily="34" charset="0"/>
@@ -7627,7 +7408,7 @@
             </a:endParaRPr>
           </a:p>
           <a:p>
-            <a:pPr eaLnBrk="1" hangingPunct="1"/>
+            <a:pPr algn="just" eaLnBrk="1" hangingPunct="1"/>
             <a:r>
               <a:rPr lang="en-US" sz="1700" dirty="0" err="1" smtClean="0">
                 <a:latin typeface="Verdana" panose="020B0604030504040204" pitchFamily="34" charset="0"/>
@@ -7662,7 +7443,7 @@
             </a:r>
           </a:p>
           <a:p>
-            <a:pPr eaLnBrk="1" hangingPunct="1"/>
+            <a:pPr algn="just" eaLnBrk="1" hangingPunct="1"/>
             <a:endParaRPr lang="en-US" sz="1700" dirty="0" smtClean="0">
               <a:latin typeface="Verdana" panose="020B0604030504040204" pitchFamily="34" charset="0"/>
               <a:ea typeface="Verdana" panose="020B0604030504040204" pitchFamily="34" charset="0"/>
@@ -7670,7 +7451,7 @@
             </a:endParaRPr>
           </a:p>
           <a:p>
-            <a:pPr eaLnBrk="1" hangingPunct="1"/>
+            <a:pPr algn="just" eaLnBrk="1" hangingPunct="1"/>
             <a:r>
               <a:rPr lang="en-US" sz="1700" dirty="0" err="1" smtClean="0">
                 <a:latin typeface="Verdana" panose="020B0604030504040204" pitchFamily="34" charset="0"/>
@@ -7721,7 +7502,7 @@
             </a:r>
           </a:p>
           <a:p>
-            <a:pPr eaLnBrk="1" hangingPunct="1"/>
+            <a:pPr algn="just" eaLnBrk="1" hangingPunct="1"/>
             <a:endParaRPr lang="en-US" sz="1700" dirty="0">
               <a:latin typeface="Verdana" panose="020B0604030504040204" pitchFamily="34" charset="0"/>
               <a:ea typeface="Verdana" panose="020B0604030504040204" pitchFamily="34" charset="0"/>
@@ -7729,7 +7510,7 @@
             </a:endParaRPr>
           </a:p>
           <a:p>
-            <a:pPr eaLnBrk="1" hangingPunct="1"/>
+            <a:pPr algn="just" eaLnBrk="1" hangingPunct="1"/>
             <a:r>
               <a:rPr lang="en-US" sz="1700" dirty="0" smtClean="0">
                 <a:latin typeface="Verdana" panose="020B0604030504040204" pitchFamily="34" charset="0"/>
@@ -7740,7 +7521,7 @@
             </a:r>
           </a:p>
           <a:p>
-            <a:pPr eaLnBrk="1" hangingPunct="1"/>
+            <a:pPr algn="just" eaLnBrk="1" hangingPunct="1"/>
             <a:endParaRPr lang="en-US" sz="1700" dirty="0">
               <a:latin typeface="Verdana" panose="020B0604030504040204" pitchFamily="34" charset="0"/>
               <a:ea typeface="Verdana" panose="020B0604030504040204" pitchFamily="34" charset="0"/>
@@ -7748,7 +7529,7 @@
             </a:endParaRPr>
           </a:p>
           <a:p>
-            <a:pPr eaLnBrk="1" hangingPunct="1"/>
+            <a:pPr algn="just" eaLnBrk="1" hangingPunct="1"/>
             <a:r>
               <a:rPr lang="en-US" sz="1700" dirty="0" err="1" smtClean="0">
                 <a:latin typeface="Verdana" panose="020B0604030504040204" pitchFamily="34" charset="0"/>
@@ -7783,7 +7564,7 @@
             </a:r>
           </a:p>
           <a:p>
-            <a:pPr eaLnBrk="1" hangingPunct="1"/>
+            <a:pPr algn="just" eaLnBrk="1" hangingPunct="1"/>
             <a:endParaRPr lang="en-US" sz="1700" dirty="0">
               <a:latin typeface="Verdana" panose="020B0604030504040204" pitchFamily="34" charset="0"/>
               <a:ea typeface="Verdana" panose="020B0604030504040204" pitchFamily="34" charset="0"/>
@@ -7791,7 +7572,7 @@
             </a:endParaRPr>
           </a:p>
           <a:p>
-            <a:pPr eaLnBrk="1" hangingPunct="1"/>
+            <a:pPr algn="just" eaLnBrk="1" hangingPunct="1"/>
             <a:r>
               <a:rPr lang="en-US" sz="1700" dirty="0" err="1" smtClean="0">
                 <a:latin typeface="Verdana" panose="020B0604030504040204" pitchFamily="34" charset="0"/>
@@ -7864,7 +7645,7 @@
           <p:cNvPr id="57" name="Rectangle 56">
             <a:extLst>
               <a:ext uri="{FF2B5EF4-FFF2-40B4-BE49-F238E27FC236}">
-                <a16:creationId xmlns:a16="http://schemas.microsoft.com/office/drawing/2014/main" xmlns="" id="{0979C4B3-6216-0941-B547-F944A3D67C6F}"/>
+                <a16:creationId xmlns="" xmlns:a16="http://schemas.microsoft.com/office/drawing/2014/main" id="{0979C4B3-6216-0941-B547-F944A3D67C6F}"/>
               </a:ext>
             </a:extLst>
           </p:cNvPr>
@@ -7873,7 +7654,7 @@
         </p:nvSpPr>
         <p:spPr>
           <a:xfrm>
-            <a:off x="20207583" y="30902175"/>
+            <a:off x="20207583" y="31717678"/>
             <a:ext cx="8407576" cy="891547"/>
           </a:xfrm>
           <a:prstGeom prst="rect">
@@ -7914,10 +7695,7 @@
             <a:r>
               <a:rPr lang="en-US" sz="5400" b="1" dirty="0">
                 <a:solidFill>
-                  <a:schemeClr val="accent3">
-                    <a:lumMod val="20000"/>
-                    <a:lumOff val="80000"/>
-                  </a:schemeClr>
+                  <a:schemeClr val="bg1"/>
                 </a:solidFill>
               </a:rPr>
               <a:t>References</a:t>
@@ -7934,7 +7712,7 @@
           <p:nvPr/>
         </p:nvPicPr>
         <p:blipFill>
-          <a:blip r:embed="rId4">
+          <a:blip r:embed="rId2">
             <a:extLst>
               <a:ext uri="{28A0092B-C50C-407E-A947-70E740481C1C}">
                 <a14:useLocalDpi xmlns:a14="http://schemas.microsoft.com/office/drawing/2010/main" val="0"/>
@@ -7964,7 +7742,7 @@
           <p:nvPr/>
         </p:nvPicPr>
         <p:blipFill>
-          <a:blip r:embed="rId5">
+          <a:blip r:embed="rId3">
             <a:extLst>
               <a:ext uri="{28A0092B-C50C-407E-A947-70E740481C1C}">
                 <a14:useLocalDpi xmlns:a14="http://schemas.microsoft.com/office/drawing/2010/main" val="0"/>
@@ -7977,7 +7755,7 @@
         </p:blipFill>
         <p:spPr>
           <a:xfrm>
-            <a:off x="2670616" y="22837279"/>
+            <a:off x="2670616" y="23293405"/>
             <a:ext cx="6429375" cy="4048125"/>
           </a:xfrm>
           <a:prstGeom prst="rect">
@@ -7995,27 +7773,17 @@
         </p:nvSpPr>
         <p:spPr bwMode="auto">
           <a:xfrm>
-            <a:off x="1681515" y="28389299"/>
+            <a:off x="1681515" y="28965363"/>
             <a:ext cx="8407576" cy="8538134"/>
           </a:xfrm>
           <a:prstGeom prst="rect">
             <a:avLst/>
           </a:prstGeom>
-          <a:solidFill>
-            <a:schemeClr val="bg1"/>
-          </a:solidFill>
+          <a:noFill/>
           <a:ln w="12700">
-            <a:solidFill>
-              <a:srgbClr val="660066"/>
-            </a:solidFill>
+            <a:noFill/>
           </a:ln>
-          <a:effectLst>
-            <a:outerShdw blurRad="50800" dist="38100" dir="2700000" algn="tl" rotWithShape="0">
-              <a:prstClr val="black">
-                <a:alpha val="40000"/>
-              </a:prstClr>
-            </a:outerShdw>
-          </a:effectLst>
+          <a:effectLst/>
         </p:spPr>
         <p:txBody>
           <a:bodyPr lIns="173940" tIns="173940" rIns="173940" bIns="173940">
@@ -8120,8 +7888,10 @@
             </a:lvl9pPr>
           </a:lstStyle>
           <a:p>
+            <a:pPr algn="just"/>
             <a:r>
               <a:rPr lang="en-GB" sz="2800" dirty="0" smtClean="0">
+                <a:effectLst/>
                 <a:latin typeface="Verdana" panose="020B0604030504040204" pitchFamily="34" charset="0"/>
                 <a:ea typeface="Verdana" panose="020B0604030504040204" pitchFamily="34" charset="0"/>
                 <a:cs typeface="Verdana" panose="020B0604030504040204" pitchFamily="34" charset="0"/>
@@ -8130,6 +7900,7 @@
             </a:r>
             <a:r>
               <a:rPr lang="en-GB" sz="2800" dirty="0">
+                <a:effectLst/>
                 <a:latin typeface="Verdana" panose="020B0604030504040204" pitchFamily="34" charset="0"/>
                 <a:ea typeface="Verdana" panose="020B0604030504040204" pitchFamily="34" charset="0"/>
                 <a:cs typeface="Verdana" panose="020B0604030504040204" pitchFamily="34" charset="0"/>
@@ -8138,6 +7909,7 @@
             </a:r>
             <a:r>
               <a:rPr lang="en-GB" sz="2800" dirty="0" smtClean="0">
+                <a:effectLst/>
                 <a:latin typeface="Verdana" panose="020B0604030504040204" pitchFamily="34" charset="0"/>
                 <a:ea typeface="Verdana" panose="020B0604030504040204" pitchFamily="34" charset="0"/>
                 <a:cs typeface="Verdana" panose="020B0604030504040204" pitchFamily="34" charset="0"/>
@@ -8146,6 +7918,7 @@
             </a:r>
             <a:r>
               <a:rPr lang="en-GB" sz="2800" dirty="0" err="1" smtClean="0">
+                <a:effectLst/>
                 <a:latin typeface="Verdana" panose="020B0604030504040204" pitchFamily="34" charset="0"/>
                 <a:ea typeface="Verdana" panose="020B0604030504040204" pitchFamily="34" charset="0"/>
                 <a:cs typeface="Verdana" panose="020B0604030504040204" pitchFamily="34" charset="0"/>
@@ -8154,6 +7927,7 @@
             </a:r>
             <a:r>
               <a:rPr lang="en-GB" sz="2800" dirty="0" smtClean="0">
+                <a:effectLst/>
                 <a:latin typeface="Verdana" panose="020B0604030504040204" pitchFamily="34" charset="0"/>
                 <a:ea typeface="Verdana" panose="020B0604030504040204" pitchFamily="34" charset="0"/>
                 <a:cs typeface="Verdana" panose="020B0604030504040204" pitchFamily="34" charset="0"/>
@@ -8162,15 +7936,19 @@
             </a:r>
           </a:p>
           <a:p>
+            <a:pPr algn="just"/>
             <a:endParaRPr lang="en-GB" sz="2800" dirty="0">
+              <a:effectLst/>
               <a:latin typeface="Verdana" panose="020B0604030504040204" pitchFamily="34" charset="0"/>
               <a:ea typeface="Verdana" panose="020B0604030504040204" pitchFamily="34" charset="0"/>
               <a:cs typeface="Verdana" panose="020B0604030504040204" pitchFamily="34" charset="0"/>
             </a:endParaRPr>
           </a:p>
           <a:p>
+            <a:pPr algn="just"/>
             <a:r>
               <a:rPr lang="en-GB" sz="2800" dirty="0" smtClean="0">
+                <a:effectLst/>
                 <a:latin typeface="Verdana" panose="020B0604030504040204" pitchFamily="34" charset="0"/>
                 <a:ea typeface="Verdana" panose="020B0604030504040204" pitchFamily="34" charset="0"/>
                 <a:cs typeface="Verdana" panose="020B0604030504040204" pitchFamily="34" charset="0"/>
@@ -8189,7 +7967,7 @@
           <p:nvPr/>
         </p:nvPicPr>
         <p:blipFill>
-          <a:blip r:embed="rId6">
+          <a:blip r:embed="rId4">
             <a:extLst>
               <a:ext uri="{28A0092B-C50C-407E-A947-70E740481C1C}">
                 <a14:useLocalDpi xmlns:a14="http://schemas.microsoft.com/office/drawing/2010/main" val="0"/>
@@ -8202,8 +7980,38 @@
         </p:blipFill>
         <p:spPr>
           <a:xfrm>
-            <a:off x="10929848" y="19020855"/>
+            <a:off x="10929848" y="19380895"/>
             <a:ext cx="8407578" cy="4023749"/>
+          </a:xfrm>
+          <a:prstGeom prst="rect">
+            <a:avLst/>
+          </a:prstGeom>
+        </p:spPr>
+      </p:pic>
+      <p:pic>
+        <p:nvPicPr>
+          <p:cNvPr id="3" name="Picture 2"/>
+          <p:cNvPicPr>
+            <a:picLocks noChangeAspect="1"/>
+          </p:cNvPicPr>
+          <p:nvPr/>
+        </p:nvPicPr>
+        <p:blipFill>
+          <a:blip r:embed="rId5" cstate="print">
+            <a:extLst>
+              <a:ext uri="{28A0092B-C50C-407E-A947-70E740481C1C}">
+                <a14:useLocalDpi xmlns:a14="http://schemas.microsoft.com/office/drawing/2010/main" val="0"/>
+              </a:ext>
+            </a:extLst>
+          </a:blip>
+          <a:stretch>
+            <a:fillRect/>
+          </a:stretch>
+        </p:blipFill>
+        <p:spPr>
+          <a:xfrm>
+            <a:off x="458214" y="40472963"/>
+            <a:ext cx="8641777" cy="1570293"/>
           </a:xfrm>
           <a:prstGeom prst="rect">
             <a:avLst/>

</xml_diff>